<commit_message>
Added error handling and finished almost all the powerpoint
</commit_message>
<xml_diff>
--- a/Apresentacao Projeto 1.pptx
+++ b/Apresentacao Projeto 1.pptx
@@ -13,8 +13,9 @@
     <p:sldId id="261" r:id="rId7"/>
     <p:sldId id="262" r:id="rId8"/>
     <p:sldId id="263" r:id="rId9"/>
-    <p:sldId id="264" r:id="rId10"/>
-    <p:sldId id="265" r:id="rId11"/>
+    <p:sldId id="266" r:id="rId10"/>
+    <p:sldId id="264" r:id="rId11"/>
+    <p:sldId id="265" r:id="rId12"/>
   </p:sldIdLst>
   <p:sldSz cx="12192000" cy="6858000"/>
   <p:notesSz cx="6858000" cy="9144000"/>
@@ -113,6 +114,11 @@
       </a:defRPr>
     </a:lvl9pPr>
   </p:defaultTextStyle>
+  <p:extLst>
+    <p:ext uri="{EFAFB233-063F-42B5-8137-9DF3F51BA10A}">
+      <p15:sldGuideLst xmlns:p15="http://schemas.microsoft.com/office/powerpoint/2012/main"/>
+    </p:ext>
+  </p:extLst>
 </p:presentation>
 </file>
 
@@ -342,7 +348,7 @@
           <a:p>
             <a:fld id="{6B2E0CD3-EB13-4E18-ACFE-2900D80989C3}" type="datetimeFigureOut">
               <a:rPr lang="pt-PT" smtClean="0"/>
-              <a:t>18/11/2020</a:t>
+              <a:t>19/11/2020</a:t>
             </a:fld>
             <a:endParaRPr lang="pt-PT"/>
           </a:p>
@@ -550,7 +556,7 @@
           <a:p>
             <a:fld id="{6B2E0CD3-EB13-4E18-ACFE-2900D80989C3}" type="datetimeFigureOut">
               <a:rPr lang="pt-PT" smtClean="0"/>
-              <a:t>18/11/2020</a:t>
+              <a:t>19/11/2020</a:t>
             </a:fld>
             <a:endParaRPr lang="pt-PT"/>
           </a:p>
@@ -806,7 +812,7 @@
           <a:p>
             <a:fld id="{6B2E0CD3-EB13-4E18-ACFE-2900D80989C3}" type="datetimeFigureOut">
               <a:rPr lang="pt-PT" smtClean="0"/>
-              <a:t>18/11/2020</a:t>
+              <a:t>19/11/2020</a:t>
             </a:fld>
             <a:endParaRPr lang="pt-PT"/>
           </a:p>
@@ -980,7 +986,7 @@
           <a:p>
             <a:fld id="{6B2E0CD3-EB13-4E18-ACFE-2900D80989C3}" type="datetimeFigureOut">
               <a:rPr lang="pt-PT" smtClean="0"/>
-              <a:t>18/11/2020</a:t>
+              <a:t>19/11/2020</a:t>
             </a:fld>
             <a:endParaRPr lang="pt-PT"/>
           </a:p>
@@ -1323,7 +1329,7 @@
           <a:p>
             <a:fld id="{6B2E0CD3-EB13-4E18-ACFE-2900D80989C3}" type="datetimeFigureOut">
               <a:rPr lang="pt-PT" smtClean="0"/>
-              <a:t>18/11/2020</a:t>
+              <a:t>19/11/2020</a:t>
             </a:fld>
             <a:endParaRPr lang="pt-PT"/>
           </a:p>
@@ -1598,7 +1604,7 @@
           <a:p>
             <a:fld id="{6B2E0CD3-EB13-4E18-ACFE-2900D80989C3}" type="datetimeFigureOut">
               <a:rPr lang="pt-PT" smtClean="0"/>
-              <a:t>18/11/2020</a:t>
+              <a:t>19/11/2020</a:t>
             </a:fld>
             <a:endParaRPr lang="pt-PT"/>
           </a:p>
@@ -1977,7 +1983,7 @@
           <a:p>
             <a:fld id="{6B2E0CD3-EB13-4E18-ACFE-2900D80989C3}" type="datetimeFigureOut">
               <a:rPr lang="pt-PT" smtClean="0"/>
-              <a:t>18/11/2020</a:t>
+              <a:t>19/11/2020</a:t>
             </a:fld>
             <a:endParaRPr lang="pt-PT"/>
           </a:p>
@@ -2095,7 +2101,7 @@
           <a:p>
             <a:fld id="{6B2E0CD3-EB13-4E18-ACFE-2900D80989C3}" type="datetimeFigureOut">
               <a:rPr lang="pt-PT" smtClean="0"/>
-              <a:t>18/11/2020</a:t>
+              <a:t>19/11/2020</a:t>
             </a:fld>
             <a:endParaRPr lang="pt-PT"/>
           </a:p>
@@ -2266,7 +2272,7 @@
           <a:p>
             <a:fld id="{6B2E0CD3-EB13-4E18-ACFE-2900D80989C3}" type="datetimeFigureOut">
               <a:rPr lang="pt-PT" smtClean="0"/>
-              <a:t>18/11/2020</a:t>
+              <a:t>19/11/2020</a:t>
             </a:fld>
             <a:endParaRPr lang="pt-PT"/>
           </a:p>
@@ -2620,7 +2626,7 @@
           <a:p>
             <a:fld id="{6B2E0CD3-EB13-4E18-ACFE-2900D80989C3}" type="datetimeFigureOut">
               <a:rPr lang="pt-PT" smtClean="0"/>
-              <a:t>18/11/2020</a:t>
+              <a:t>19/11/2020</a:t>
             </a:fld>
             <a:endParaRPr lang="pt-PT"/>
           </a:p>
@@ -3002,7 +3008,7 @@
           <a:p>
             <a:fld id="{6B2E0CD3-EB13-4E18-ACFE-2900D80989C3}" type="datetimeFigureOut">
               <a:rPr lang="pt-PT" smtClean="0"/>
-              <a:t>18/11/2020</a:t>
+              <a:t>19/11/2020</a:t>
             </a:fld>
             <a:endParaRPr lang="pt-PT"/>
           </a:p>
@@ -3289,7 +3295,7 @@
           <a:p>
             <a:fld id="{6B2E0CD3-EB13-4E18-ACFE-2900D80989C3}" type="datetimeFigureOut">
               <a:rPr lang="pt-PT" smtClean="0"/>
-              <a:t>18/11/2020</a:t>
+              <a:t>19/11/2020</a:t>
             </a:fld>
             <a:endParaRPr lang="pt-PT"/>
           </a:p>
@@ -3941,6 +3947,110 @@
           <a:p>
             <a:r>
               <a:rPr lang="pt-PT" dirty="0" smtClean="0"/>
+              <a:t>Funcionalidade Destaque</a:t>
+            </a:r>
+            <a:endParaRPr lang="pt-PT" dirty="0"/>
+          </a:p>
+        </p:txBody>
+      </p:sp>
+      <p:sp>
+        <p:nvSpPr>
+          <p:cNvPr id="3" name="Marcador de Posição de Conteúdo 2"/>
+          <p:cNvSpPr>
+            <a:spLocks noGrp="1"/>
+          </p:cNvSpPr>
+          <p:nvPr>
+            <p:ph idx="1"/>
+          </p:nvPr>
+        </p:nvSpPr>
+        <p:spPr/>
+        <p:txBody>
+          <a:bodyPr/>
+          <a:lstStyle/>
+          <a:p>
+            <a:r>
+              <a:rPr lang="pt-PT" b="1" dirty="0" smtClean="0"/>
+              <a:t>Alocação dinâmica de salas</a:t>
+            </a:r>
+          </a:p>
+          <a:p>
+            <a:pPr>
+              <a:buFont typeface="Arial" panose="020B0604020202020204" pitchFamily="34" charset="0"/>
+              <a:buChar char="•"/>
+            </a:pPr>
+            <a:r>
+              <a:rPr lang="pt-PT" dirty="0" smtClean="0"/>
+              <a:t>Aloca salas aos eventos tendo em conta a sua disponibilidade no horário em que decorre o evento para que não haja sobreposição de eventos na mesma sala - Completa</a:t>
+            </a:r>
+          </a:p>
+          <a:p>
+            <a:pPr>
+              <a:buFont typeface="Arial" panose="020B0604020202020204" pitchFamily="34" charset="0"/>
+              <a:buChar char="•"/>
+            </a:pPr>
+            <a:r>
+              <a:rPr lang="pt-PT" dirty="0" smtClean="0"/>
+              <a:t>Permite a alocação de salas aos eventos de forma a otimizar o rácio capacidade </a:t>
+            </a:r>
+            <a:r>
+              <a:rPr lang="pt-PT" dirty="0"/>
+              <a:t>da sala/lotação máxima do evento</a:t>
+            </a:r>
+            <a:r>
+              <a:rPr lang="pt-PT" dirty="0" smtClean="0"/>
+              <a:t> - Completa</a:t>
+            </a:r>
+            <a:endParaRPr lang="pt-PT" dirty="0"/>
+          </a:p>
+        </p:txBody>
+      </p:sp>
+    </p:spTree>
+    <p:extLst>
+      <p:ext uri="{BB962C8B-B14F-4D97-AF65-F5344CB8AC3E}">
+        <p14:creationId xmlns:p14="http://schemas.microsoft.com/office/powerpoint/2010/main" val="3695671712"/>
+      </p:ext>
+    </p:extLst>
+  </p:cSld>
+  <p:clrMapOvr>
+    <a:masterClrMapping/>
+  </p:clrMapOvr>
+</p:sld>
+</file>
+
+<file path=ppt/slides/slide11.xml><?xml version="1.0" encoding="utf-8"?>
+<p:sld xmlns:a="http://schemas.openxmlformats.org/drawingml/2006/main" xmlns:r="http://schemas.openxmlformats.org/officeDocument/2006/relationships" xmlns:p="http://schemas.openxmlformats.org/presentationml/2006/main">
+  <p:cSld>
+    <p:spTree>
+      <p:nvGrpSpPr>
+        <p:cNvPr id="1" name=""/>
+        <p:cNvGrpSpPr/>
+        <p:nvPr/>
+      </p:nvGrpSpPr>
+      <p:grpSpPr>
+        <a:xfrm>
+          <a:off x="0" y="0"/>
+          <a:ext cx="0" cy="0"/>
+          <a:chOff x="0" y="0"/>
+          <a:chExt cx="0" cy="0"/>
+        </a:xfrm>
+      </p:grpSpPr>
+      <p:sp>
+        <p:nvSpPr>
+          <p:cNvPr id="2" name="Título 1"/>
+          <p:cNvSpPr>
+            <a:spLocks noGrp="1"/>
+          </p:cNvSpPr>
+          <p:nvPr>
+            <p:ph type="title"/>
+          </p:nvPr>
+        </p:nvSpPr>
+        <p:spPr/>
+        <p:txBody>
+          <a:bodyPr/>
+          <a:lstStyle/>
+          <a:p>
+            <a:r>
+              <a:rPr lang="pt-PT" dirty="0" smtClean="0"/>
               <a:t>Dificuldades e Esforço</a:t>
             </a:r>
             <a:endParaRPr lang="pt-PT" dirty="0"/>
@@ -3962,7 +4072,36 @@
           <a:bodyPr/>
           <a:lstStyle/>
           <a:p>
-            <a:endParaRPr lang="pt-PT"/>
+            <a:pPr algn="just"/>
+            <a:r>
+              <a:rPr lang="pt-PT" dirty="0" smtClean="0"/>
+              <a:t>De forma geral não sentimos grandes dificuldades na execução do projeto pedido, sendo que acreditamos ter cumprido todos os requisitos necessários.</a:t>
+            </a:r>
+          </a:p>
+          <a:p>
+            <a:pPr algn="just"/>
+            <a:r>
+              <a:rPr lang="pt-PT" dirty="0" smtClean="0"/>
+              <a:t>O único aspeto no qual podemos realçar alguma dificuldade foi na manipulação de elementos em listas, especificamente com a alteração de valores de objetos que estavam guardados numa lista, sendo que esta dificuldade foi ultrapassada com a utilização de </a:t>
+            </a:r>
+            <a:r>
+              <a:rPr lang="pt-PT" dirty="0" err="1" smtClean="0"/>
+              <a:t>iteradores</a:t>
+            </a:r>
+            <a:r>
+              <a:rPr lang="pt-PT" dirty="0" smtClean="0"/>
+              <a:t>.</a:t>
+            </a:r>
+          </a:p>
+          <a:p>
+            <a:pPr algn="just"/>
+            <a:r>
+              <a:rPr lang="pt-PT" dirty="0" smtClean="0"/>
+              <a:t>Ambos os elementos do grupo dedicaram o mesmo nível de esforço à execução do projeto, sendo que sentimos que houve uma divisão justa de tarefas e que ambos os elementos cumpriram com a sua parte.</a:t>
+            </a:r>
+          </a:p>
+          <a:p>
+            <a:endParaRPr lang="pt-PT" dirty="0"/>
           </a:p>
         </p:txBody>
       </p:sp>
@@ -4129,12 +4268,86 @@
             <p:ph idx="1"/>
           </p:nvPr>
         </p:nvSpPr>
-        <p:spPr/>
-        <p:txBody>
-          <a:bodyPr/>
-          <a:lstStyle/>
-          <a:p>
-            <a:endParaRPr lang="pt-PT"/>
+        <p:spPr>
+          <a:xfrm>
+            <a:off x="1097279" y="1845733"/>
+            <a:ext cx="10271305" cy="4282111"/>
+          </a:xfrm>
+        </p:spPr>
+        <p:txBody>
+          <a:bodyPr>
+            <a:normAutofit fontScale="92500"/>
+          </a:bodyPr>
+          <a:lstStyle/>
+          <a:p>
+            <a:pPr algn="just"/>
+            <a:r>
+              <a:rPr lang="pt-PT" dirty="0" smtClean="0"/>
+              <a:t>Na implementação duma solução para o problema anterior foi então </a:t>
+            </a:r>
+            <a:r>
+              <a:rPr lang="pt-PT" dirty="0"/>
+              <a:t>criada uma interface acessível e </a:t>
+            </a:r>
+            <a:r>
+              <a:rPr lang="pt-PT" dirty="0" smtClean="0"/>
+              <a:t>intuitiva</a:t>
+            </a:r>
+            <a:r>
+              <a:rPr lang="pt-PT" dirty="0" smtClean="0"/>
+              <a:t>, a partir da qual podemos gerir todas as necessidades descritas anteriormente.</a:t>
+            </a:r>
+          </a:p>
+          <a:p>
+            <a:pPr algn="just"/>
+            <a:r>
+              <a:rPr lang="pt-PT" dirty="0" smtClean="0"/>
+              <a:t>A partir do menu principal temos várias opções relativas à gestão dos eventos, nomeadamente a possibilidade de adicionar, listar, apagar e ordenar os vários eventos. </a:t>
+            </a:r>
+            <a:r>
+              <a:rPr lang="pt-PT" dirty="0" smtClean="0"/>
+              <a:t>Ao aceder ás informações de cada evento conseguimos ainda ver informações importantes como o número de bilhetes vendidos e o lucro total de vendas até à data.</a:t>
+            </a:r>
+            <a:endParaRPr lang="pt-PT" dirty="0" smtClean="0"/>
+          </a:p>
+          <a:p>
+            <a:pPr algn="just"/>
+            <a:r>
+              <a:rPr lang="pt-PT" dirty="0" smtClean="0"/>
+              <a:t>Foi criado um </a:t>
+            </a:r>
+            <a:r>
+              <a:rPr lang="pt-PT" dirty="0" err="1" smtClean="0"/>
+              <a:t>kiosk</a:t>
+            </a:r>
+            <a:r>
+              <a:rPr lang="pt-PT" dirty="0" smtClean="0"/>
+              <a:t> no qual o utilizador pode proceder à compra dos bilhetes para um determinado evento, tendo em conta os casos em que: o utilizador não é um aderente do </a:t>
+            </a:r>
+            <a:r>
+              <a:rPr lang="pt-PT" dirty="0"/>
+              <a:t>Cartão de Amigos da </a:t>
+            </a:r>
+            <a:r>
+              <a:rPr lang="pt-PT" dirty="0" smtClean="0"/>
+              <a:t>Cinemateca, o utilizador é um aderente (sendo aplicados os descontos correspondentes) e também o caso em que o utilizador tem mais de 65 anos, tendo a possibilidade de ter um bilhete gratuito (sendo aplicadas as limitações necessárias para essa promoção).</a:t>
+            </a:r>
+          </a:p>
+          <a:p>
+            <a:pPr algn="just"/>
+            <a:r>
+              <a:rPr lang="pt-PT" dirty="0" smtClean="0"/>
+              <a:t>Conseguimos ainda registar um novo aderente </a:t>
+            </a:r>
+            <a:r>
+              <a:rPr lang="pt-PT" dirty="0"/>
+              <a:t>ao Cartão de Amigos da Cinemateca em </a:t>
+            </a:r>
+            <a:r>
+              <a:rPr lang="pt-PT" dirty="0" smtClean="0"/>
+              <a:t>qualquer momento, independentemente da compra ou não de um bilhete, sendo também possível listar, ordenar e apagar aderentes dos registos de aderentes.</a:t>
+            </a:r>
+            <a:endParaRPr lang="pt-PT" dirty="0"/>
           </a:p>
         </p:txBody>
       </p:sp>
@@ -4178,7 +4391,12 @@
             <p:ph type="title"/>
           </p:nvPr>
         </p:nvSpPr>
-        <p:spPr/>
+        <p:spPr>
+          <a:xfrm>
+            <a:off x="1084998" y="286603"/>
+            <a:ext cx="10058400" cy="1450757"/>
+          </a:xfrm>
+        </p:spPr>
         <p:txBody>
           <a:bodyPr/>
           <a:lstStyle/>
@@ -4201,12 +4419,98 @@
             <p:ph idx="1"/>
           </p:nvPr>
         </p:nvSpPr>
-        <p:spPr/>
-        <p:txBody>
-          <a:bodyPr/>
-          <a:lstStyle/>
-          <a:p>
-            <a:endParaRPr lang="pt-PT"/>
+        <p:spPr>
+          <a:xfrm>
+            <a:off x="395786" y="1741455"/>
+            <a:ext cx="11655188" cy="4659346"/>
+          </a:xfrm>
+        </p:spPr>
+        <p:txBody>
+          <a:bodyPr>
+            <a:normAutofit fontScale="85000" lnSpcReduction="10000"/>
+          </a:bodyPr>
+          <a:lstStyle/>
+          <a:p>
+            <a:r>
+              <a:rPr lang="pt-PT" b="1" dirty="0" smtClean="0"/>
+              <a:t>Algoritmo de alocação de salas</a:t>
+            </a:r>
+            <a:r>
+              <a:rPr lang="pt-PT" dirty="0" smtClean="0"/>
+              <a:t/>
+            </a:r>
+            <a:br>
+              <a:rPr lang="pt-PT" dirty="0" smtClean="0"/>
+            </a:br>
+            <a:r>
+              <a:rPr lang="pt-PT" dirty="0" smtClean="0"/>
+              <a:t>A </a:t>
+            </a:r>
+            <a:r>
+              <a:rPr lang="pt-PT" dirty="0" smtClean="0"/>
+              <a:t>alocação de salas aos eventos é feita de forma a otimizar o rácio capacidade da sala/lotação máxima do evento. Ou seja, alocamos as salas de forma a que a lotação máxima do evento seja o mais próxima possível da capacidade da sala, de forma a minimizar o número de lugares desperdiçados. Esta alocação é feita com recurso à ordenação de forma ascendente das capacidades das salas, sendo também verificada a disponibilidade de cada sala para aquele evento, e em caso de disponibilidade é feita a atribuição da sala com menor capacidade viável para o evento.</a:t>
+            </a:r>
+            <a:endParaRPr lang="pt-PT" dirty="0" smtClean="0"/>
+          </a:p>
+          <a:p>
+            <a:r>
+              <a:rPr lang="pt-PT" b="1" dirty="0" smtClean="0"/>
+              <a:t>Algoritmos de ordenação de eventos</a:t>
+            </a:r>
+            <a:r>
+              <a:rPr lang="pt-PT" dirty="0" smtClean="0"/>
+              <a:t/>
+            </a:r>
+            <a:br>
+              <a:rPr lang="pt-PT" dirty="0" smtClean="0"/>
+            </a:br>
+            <a:r>
+              <a:rPr lang="pt-PT" dirty="0" smtClean="0"/>
+              <a:t>No contexto de ordenação de eventos, foram criadas várias possíveis ordenações das quais o utilizador pode escolher: ordenação por nome do evento (ordem alfabética), ordenação por data do evento (da mais antiga para a mais recente), ordenação por preço do evento (do menor para o maior preço), e por fim ordenação pela lotação máxima do evento (da menor para a maior). </a:t>
+            </a:r>
+          </a:p>
+          <a:p>
+            <a:r>
+              <a:rPr lang="pt-PT" b="1" dirty="0" smtClean="0"/>
+              <a:t>Algoritmos de ordenação de aderentes</a:t>
+            </a:r>
+            <a:r>
+              <a:rPr lang="pt-PT" dirty="0" smtClean="0"/>
+              <a:t/>
+            </a:r>
+            <a:br>
+              <a:rPr lang="pt-PT" dirty="0" smtClean="0"/>
+            </a:br>
+            <a:r>
+              <a:rPr lang="pt-PT" dirty="0" smtClean="0"/>
+              <a:t>No caso da ordenação de aderentes, implementamos as seguintes opções: ordenação por nome do aderente (ordem alfabética), ordenação por data de </a:t>
+            </a:r>
+            <a:r>
+              <a:rPr lang="pt-PT" dirty="0"/>
+              <a:t>nascimento (da mais antiga para a mais </a:t>
+            </a:r>
+            <a:r>
+              <a:rPr lang="pt-PT" dirty="0" smtClean="0"/>
+              <a:t>recente), e ordenação pelo ano em que aderiram ao Cartão de Amigos da Cinemateca (do mais antigo para o mais recente)</a:t>
+            </a:r>
+          </a:p>
+          <a:p>
+            <a:r>
+              <a:rPr lang="pt-PT" b="1" dirty="0" smtClean="0"/>
+              <a:t>Algoritmos de pesquisa</a:t>
+            </a:r>
+            <a:r>
+              <a:rPr lang="pt-PT" dirty="0" smtClean="0"/>
+              <a:t/>
+            </a:r>
+            <a:br>
+              <a:rPr lang="pt-PT" dirty="0" smtClean="0"/>
+            </a:br>
+            <a:r>
+              <a:rPr lang="pt-PT" dirty="0" smtClean="0"/>
+              <a:t>Ao longo de todo o projeto estão várias vezes presentes algoritmos de pesquisa em listas que nos permitem implementar várias das funcionalidades que temos no projeto, sendo que como exemplo foram utilizados de forma a permitir apagar eventos com um certo nome da lista de eventos ou apagar aderentes com um determinado NIF da lista de aderentes.</a:t>
+            </a:r>
+            <a:endParaRPr lang="pt-PT" dirty="0"/>
           </a:p>
         </p:txBody>
       </p:sp>
@@ -4347,10 +4651,117 @@
         </p:nvSpPr>
         <p:spPr/>
         <p:txBody>
-          <a:bodyPr/>
-          <a:lstStyle/>
-          <a:p>
-            <a:endParaRPr lang="pt-PT"/>
+          <a:bodyPr>
+            <a:normAutofit lnSpcReduction="10000"/>
+          </a:bodyPr>
+          <a:lstStyle/>
+          <a:p>
+            <a:r>
+              <a:rPr lang="pt-PT" dirty="0" smtClean="0"/>
+              <a:t>Toda a informação relativa aos dados dos aderentes, não aderentes, salas e eventos é guardada em ficheiros de forma a que essa informação esteja sempre disponível ao voltar a correr o programa.</a:t>
+            </a:r>
+          </a:p>
+          <a:p>
+            <a:r>
+              <a:rPr lang="pt-PT" dirty="0" smtClean="0"/>
+              <a:t>Ao inicializar o programa, os ficheiros aderentes.dat, não_aderentes.dat, eventos.dat e salas.dat são abertos e toda a informação neles guardada é inserida nas respetivas estruturas de dados das classes. Isto é feito com recurso ás </a:t>
+            </a:r>
+            <a:r>
+              <a:rPr lang="pt-PT" b="1" dirty="0" smtClean="0"/>
+              <a:t>funções de parse </a:t>
+            </a:r>
+            <a:r>
+              <a:rPr lang="pt-PT" dirty="0" smtClean="0"/>
+              <a:t>que criamos para cada ficheiro, nomeadamente a </a:t>
+            </a:r>
+            <a:r>
+              <a:rPr lang="pt-PT" dirty="0" err="1" smtClean="0"/>
+              <a:t>parseSalas</a:t>
+            </a:r>
+            <a:r>
+              <a:rPr lang="pt-PT" dirty="0" smtClean="0"/>
+              <a:t>, </a:t>
+            </a:r>
+            <a:r>
+              <a:rPr lang="pt-PT" dirty="0" err="1" smtClean="0"/>
+              <a:t>parseEventos</a:t>
+            </a:r>
+            <a:r>
+              <a:rPr lang="pt-PT" dirty="0" smtClean="0"/>
+              <a:t>, </a:t>
+            </a:r>
+            <a:r>
+              <a:rPr lang="pt-PT" dirty="0" err="1" smtClean="0"/>
+              <a:t>parseAderentes</a:t>
+            </a:r>
+            <a:r>
+              <a:rPr lang="pt-PT" dirty="0" smtClean="0"/>
+              <a:t> e </a:t>
+            </a:r>
+            <a:r>
+              <a:rPr lang="pt-PT" dirty="0" err="1" smtClean="0"/>
+              <a:t>parseNaoAderentes</a:t>
+            </a:r>
+            <a:r>
+              <a:rPr lang="pt-PT" dirty="0" smtClean="0"/>
+              <a:t>.</a:t>
+            </a:r>
+          </a:p>
+          <a:p>
+            <a:r>
+              <a:rPr lang="pt-PT" dirty="0" smtClean="0"/>
+              <a:t>Sempre que é adicionado um aderente, um não aderente (utilizador comum) ou um evento, a informação é logo atualizada no ficheiro correspondente e não apenas aquando do término do programa.</a:t>
+            </a:r>
+          </a:p>
+          <a:p>
+            <a:r>
+              <a:rPr lang="pt-PT" dirty="0" smtClean="0"/>
+              <a:t>O mesmo sucede com a deleção de aderentes ou eventos, de forma que a informação guardada em ficheiro esteja sempre atualizada. Isto é feito com recurso ás </a:t>
+            </a:r>
+            <a:r>
+              <a:rPr lang="pt-PT" b="1" dirty="0" smtClean="0"/>
+              <a:t>funç</a:t>
+            </a:r>
+            <a:r>
+              <a:rPr lang="pt-PT" b="1" dirty="0" smtClean="0"/>
+              <a:t>ões de </a:t>
+            </a:r>
+            <a:r>
+              <a:rPr lang="pt-PT" b="1" dirty="0" err="1" smtClean="0"/>
+              <a:t>update</a:t>
+            </a:r>
+            <a:r>
+              <a:rPr lang="pt-PT" dirty="0" smtClean="0"/>
+              <a:t>, nomeadamente a </a:t>
+            </a:r>
+            <a:r>
+              <a:rPr lang="pt-PT" dirty="0" err="1" smtClean="0"/>
+              <a:t>updateAderentes</a:t>
+            </a:r>
+            <a:r>
+              <a:rPr lang="pt-PT" dirty="0" smtClean="0"/>
+              <a:t>, </a:t>
+            </a:r>
+            <a:r>
+              <a:rPr lang="pt-PT" dirty="0" err="1" smtClean="0"/>
+              <a:t>updateNaoAderentes</a:t>
+            </a:r>
+            <a:r>
+              <a:rPr lang="pt-PT" dirty="0" smtClean="0"/>
+              <a:t> e </a:t>
+            </a:r>
+            <a:r>
+              <a:rPr lang="pt-PT" dirty="0" err="1" smtClean="0"/>
+              <a:t>updateEventos</a:t>
+            </a:r>
+            <a:r>
+              <a:rPr lang="pt-PT" dirty="0" smtClean="0"/>
+              <a:t>.</a:t>
+            </a:r>
+            <a:endParaRPr lang="pt-PT" dirty="0" smtClean="0"/>
+          </a:p>
+          <a:p>
+            <a:endParaRPr lang="pt-PT" dirty="0"/>
           </a:p>
         </p:txBody>
       </p:sp>
@@ -4419,10 +4830,78 @@
         </p:nvSpPr>
         <p:spPr/>
         <p:txBody>
-          <a:bodyPr/>
-          <a:lstStyle/>
-          <a:p>
-            <a:endParaRPr lang="pt-PT"/>
+          <a:bodyPr>
+            <a:normAutofit lnSpcReduction="10000"/>
+          </a:bodyPr>
+          <a:lstStyle/>
+          <a:p>
+            <a:r>
+              <a:rPr lang="pt-PT" dirty="0" smtClean="0"/>
+              <a:t>Ao longo do projeto foram feitos tratamentos para vários tipos de exceções, dos quais damos como exemplo:</a:t>
+            </a:r>
+          </a:p>
+          <a:p>
+            <a:r>
+              <a:rPr lang="pt-PT" b="1" dirty="0"/>
+              <a:t>I</a:t>
+            </a:r>
+            <a:r>
+              <a:rPr lang="pt-PT" b="1" dirty="0" smtClean="0"/>
+              <a:t>nputs inválidos </a:t>
+            </a:r>
+            <a:r>
+              <a:rPr lang="pt-PT" dirty="0" smtClean="0"/>
+              <a:t/>
+            </a:r>
+            <a:br>
+              <a:rPr lang="pt-PT" dirty="0" smtClean="0"/>
+            </a:br>
+            <a:r>
+              <a:rPr lang="pt-PT" dirty="0" smtClean="0"/>
+              <a:t>Escolha de uma opção que não está no menu em causa pede ao utilizador para voltar a inserir uma opção válida, </a:t>
+            </a:r>
+            <a:r>
+              <a:rPr lang="pt-PT" dirty="0"/>
+              <a:t>inserção de datas no formato errado pede ao utilizador para voltar a escrever a data até esta estar no formato </a:t>
+            </a:r>
+            <a:r>
+              <a:rPr lang="pt-PT" dirty="0" err="1" smtClean="0"/>
+              <a:t>dd</a:t>
+            </a:r>
+            <a:r>
+              <a:rPr lang="pt-PT" dirty="0" smtClean="0"/>
+              <a:t>/mm/</a:t>
+            </a:r>
+            <a:r>
+              <a:rPr lang="pt-PT" dirty="0" err="1" smtClean="0"/>
+              <a:t>aaaa</a:t>
+            </a:r>
+            <a:r>
+              <a:rPr lang="pt-PT" dirty="0" smtClean="0"/>
+              <a:t>, ao inserir o NIF é necessário que este tenha o comprimento correto de 9 dígitos, ao comprar um bilhete para um determinado evento, é verificado se um evento com aquele nome realmente existe, e caso não exista é impressa uma mensagem de erro e volta ao menu </a:t>
+            </a:r>
+            <a:r>
+              <a:rPr lang="pt-PT" smtClean="0"/>
+              <a:t>de compra.</a:t>
+            </a:r>
+            <a:endParaRPr lang="pt-PT" dirty="0" smtClean="0"/>
+          </a:p>
+          <a:p>
+            <a:r>
+              <a:rPr lang="pt-PT" b="1" dirty="0" smtClean="0"/>
+              <a:t>Abertura de ficheiros</a:t>
+            </a:r>
+            <a:br>
+              <a:rPr lang="pt-PT" b="1" dirty="0" smtClean="0"/>
+            </a:br>
+            <a:r>
+              <a:rPr lang="pt-PT" dirty="0" smtClean="0"/>
+              <a:t>Caso ocorra um erro na abertura de um ficheiro, por exemplo ao inicializar o programa quando as várias listas são preenchidas com os dados guardados em ficheiro relativos aos aderentes, não aderentes e aos eventos, é feito o tratamento deste erro.</a:t>
+            </a:r>
+            <a:endParaRPr lang="pt-PT" b="1" dirty="0" smtClean="0"/>
+          </a:p>
+          <a:p>
+            <a:endParaRPr lang="pt-PT" dirty="0"/>
           </a:p>
         </p:txBody>
       </p:sp>
@@ -4489,14 +4968,128 @@
             <p:ph idx="1"/>
           </p:nvPr>
         </p:nvSpPr>
-        <p:spPr/>
-        <p:txBody>
-          <a:bodyPr/>
-          <a:lstStyle/>
-          <a:p>
-            <a:r>
-              <a:rPr lang="pt-PT" dirty="0"/>
-              <a:t>Lista de funcionalidades implementadas, incluindo CRUD, listagem, pesquisa e outras (1 a 3 slides com indicação para cada uma de: OK/Completa, Parcial)</a:t>
+        <p:spPr>
+          <a:xfrm>
+            <a:off x="1097279" y="1845734"/>
+            <a:ext cx="10844512" cy="4459532"/>
+          </a:xfrm>
+        </p:spPr>
+        <p:txBody>
+          <a:bodyPr>
+            <a:normAutofit fontScale="85000" lnSpcReduction="20000"/>
+          </a:bodyPr>
+          <a:lstStyle/>
+          <a:p>
+            <a:r>
+              <a:rPr lang="pt-PT" b="1" dirty="0" smtClean="0"/>
+              <a:t>Eventos</a:t>
+            </a:r>
+          </a:p>
+          <a:p>
+            <a:pPr>
+              <a:buFont typeface="Arial" panose="020B0604020202020204" pitchFamily="34" charset="0"/>
+              <a:buChar char="•"/>
+            </a:pPr>
+            <a:r>
+              <a:rPr lang="pt-PT" dirty="0" smtClean="0"/>
+              <a:t>Adicionar novo evento – Completa</a:t>
+            </a:r>
+          </a:p>
+          <a:p>
+            <a:pPr>
+              <a:buFont typeface="Arial" panose="020B0604020202020204" pitchFamily="34" charset="0"/>
+              <a:buChar char="•"/>
+            </a:pPr>
+            <a:r>
+              <a:rPr lang="pt-PT" dirty="0" smtClean="0"/>
+              <a:t>Remover evento – Completa</a:t>
+            </a:r>
+          </a:p>
+          <a:p>
+            <a:pPr>
+              <a:buFont typeface="Arial" panose="020B0604020202020204" pitchFamily="34" charset="0"/>
+              <a:buChar char="•"/>
+            </a:pPr>
+            <a:r>
+              <a:rPr lang="pt-PT" dirty="0" smtClean="0"/>
+              <a:t>Listar todos os eventos existentes – Completa</a:t>
+            </a:r>
+          </a:p>
+          <a:p>
+            <a:pPr>
+              <a:buFont typeface="Arial" panose="020B0604020202020204" pitchFamily="34" charset="0"/>
+              <a:buChar char="•"/>
+            </a:pPr>
+            <a:r>
+              <a:rPr lang="pt-PT" dirty="0" smtClean="0"/>
+              <a:t>Listar informação de cada evento – Completa</a:t>
+            </a:r>
+          </a:p>
+          <a:p>
+            <a:pPr>
+              <a:buFont typeface="Arial" panose="020B0604020202020204" pitchFamily="34" charset="0"/>
+              <a:buChar char="•"/>
+            </a:pPr>
+            <a:r>
+              <a:rPr lang="pt-PT" dirty="0" smtClean="0"/>
+              <a:t>Ordenar eventos de acordo com vários parâmetros (nome, data, preço, lotação) – Completa</a:t>
+            </a:r>
+          </a:p>
+          <a:p>
+            <a:pPr>
+              <a:buFont typeface="Arial" panose="020B0604020202020204" pitchFamily="34" charset="0"/>
+              <a:buChar char="•"/>
+            </a:pPr>
+            <a:r>
+              <a:rPr lang="pt-PT" dirty="0" smtClean="0"/>
+              <a:t>Informação sobre número de bilhetes comprados e total de vendas atualizada sempre que ocorre uma compra - Completa</a:t>
+            </a:r>
+            <a:endParaRPr lang="pt-PT" dirty="0"/>
+          </a:p>
+          <a:p>
+            <a:r>
+              <a:rPr lang="pt-PT" b="1" dirty="0" smtClean="0"/>
+              <a:t>Aderentes</a:t>
+            </a:r>
+          </a:p>
+          <a:p>
+            <a:pPr>
+              <a:buFont typeface="Arial" panose="020B0604020202020204" pitchFamily="34" charset="0"/>
+              <a:buChar char="•"/>
+            </a:pPr>
+            <a:r>
+              <a:rPr lang="pt-PT" dirty="0" smtClean="0"/>
+              <a:t>Adicionar novo aderente – Completa</a:t>
+            </a:r>
+          </a:p>
+          <a:p>
+            <a:pPr>
+              <a:buFont typeface="Arial" panose="020B0604020202020204" pitchFamily="34" charset="0"/>
+              <a:buChar char="•"/>
+            </a:pPr>
+            <a:r>
+              <a:rPr lang="pt-PT" dirty="0" smtClean="0"/>
+              <a:t>Remover aderente – Completa</a:t>
+            </a:r>
+          </a:p>
+          <a:p>
+            <a:pPr>
+              <a:buFont typeface="Arial" panose="020B0604020202020204" pitchFamily="34" charset="0"/>
+              <a:buChar char="•"/>
+            </a:pPr>
+            <a:r>
+              <a:rPr lang="pt-PT" dirty="0" smtClean="0"/>
+              <a:t>Listar todos os aderentes e as suas informações – Completa</a:t>
+            </a:r>
+          </a:p>
+          <a:p>
+            <a:pPr>
+              <a:buFont typeface="Arial" panose="020B0604020202020204" pitchFamily="34" charset="0"/>
+              <a:buChar char="•"/>
+            </a:pPr>
+            <a:r>
+              <a:rPr lang="pt-PT" dirty="0" smtClean="0"/>
+              <a:t>Ordenar aderentes de acordo com vários parâmetros (nome, data de nascimento, ano de adesão) - Completa</a:t>
             </a:r>
           </a:p>
           <a:p>
@@ -4551,7 +5144,7 @@
           <a:p>
             <a:r>
               <a:rPr lang="pt-PT" dirty="0" smtClean="0"/>
-              <a:t>Funcionalidade Destaque</a:t>
+              <a:t>Funcionalidades Implementadas</a:t>
             </a:r>
             <a:endParaRPr lang="pt-PT" dirty="0"/>
           </a:p>
@@ -4569,17 +5162,76 @@
         </p:nvSpPr>
         <p:spPr/>
         <p:txBody>
-          <a:bodyPr/>
-          <a:lstStyle/>
-          <a:p>
-            <a:endParaRPr lang="pt-PT"/>
+          <a:bodyPr>
+            <a:normAutofit/>
+          </a:bodyPr>
+          <a:lstStyle/>
+          <a:p>
+            <a:r>
+              <a:rPr lang="pt-PT" b="1" dirty="0" smtClean="0"/>
+              <a:t>Comprar bilhete</a:t>
+            </a:r>
+          </a:p>
+          <a:p>
+            <a:pPr>
+              <a:buFont typeface="Arial" panose="020B0604020202020204" pitchFamily="34" charset="0"/>
+              <a:buChar char="•"/>
+            </a:pPr>
+            <a:r>
+              <a:rPr lang="pt-PT" dirty="0" smtClean="0"/>
+              <a:t>Comprar bilhete caso o utilizador não seja aderente - Completa</a:t>
+            </a:r>
+          </a:p>
+          <a:p>
+            <a:pPr>
+              <a:buFont typeface="Arial" panose="020B0604020202020204" pitchFamily="34" charset="0"/>
+              <a:buChar char="•"/>
+            </a:pPr>
+            <a:r>
+              <a:rPr lang="pt-PT" dirty="0" smtClean="0"/>
+              <a:t>Comprar bilhete caso o utilizador seja aderente - Completa</a:t>
+            </a:r>
+          </a:p>
+          <a:p>
+            <a:pPr>
+              <a:buFont typeface="Arial" panose="020B0604020202020204" pitchFamily="34" charset="0"/>
+              <a:buChar char="•"/>
+            </a:pPr>
+            <a:r>
+              <a:rPr lang="pt-PT" dirty="0" smtClean="0"/>
+              <a:t>Aplicação de desconto a aderente de acordo com o ano de adesão (max. 15%) - Completa</a:t>
+            </a:r>
+          </a:p>
+          <a:p>
+            <a:pPr>
+              <a:buFont typeface="Arial" panose="020B0604020202020204" pitchFamily="34" charset="0"/>
+              <a:buChar char="•"/>
+            </a:pPr>
+            <a:r>
+              <a:rPr lang="pt-PT" dirty="0" smtClean="0"/>
+              <a:t>Opção de bilhete gratuito para aderentes do Porto com mais de 65 anos caso o número de bilhetes comprados seja menor que 50% do total de bilhetes – Completa</a:t>
+            </a:r>
+          </a:p>
+          <a:p>
+            <a:pPr>
+              <a:buFont typeface="Arial" panose="020B0604020202020204" pitchFamily="34" charset="0"/>
+              <a:buChar char="•"/>
+            </a:pPr>
+            <a:r>
+              <a:rPr lang="pt-PT" dirty="0" smtClean="0"/>
+              <a:t>Ordenar eventos de acordo com vários parâmetros (nome, data, preço, lotação) - Completa</a:t>
+            </a:r>
+            <a:endParaRPr lang="pt-PT" dirty="0"/>
+          </a:p>
+          <a:p>
+            <a:endParaRPr lang="pt-PT" dirty="0"/>
           </a:p>
         </p:txBody>
       </p:sp>
     </p:spTree>
     <p:extLst>
       <p:ext uri="{BB962C8B-B14F-4D97-AF65-F5344CB8AC3E}">
-        <p14:creationId xmlns:p14="http://schemas.microsoft.com/office/powerpoint/2010/main" val="3695671712"/>
+        <p14:creationId xmlns:p14="http://schemas.microsoft.com/office/powerpoint/2010/main" val="4052263421"/>
       </p:ext>
     </p:extLst>
   </p:cSld>

</xml_diff>

<commit_message>
finished powerpoint and class diagram :)
</commit_message>
<xml_diff>
--- a/Apresentacao Projeto 1.pptx
+++ b/Apresentacao Projeto 1.pptx
@@ -10,12 +10,14 @@
     <p:sldId id="258" r:id="rId4"/>
     <p:sldId id="259" r:id="rId5"/>
     <p:sldId id="260" r:id="rId6"/>
-    <p:sldId id="261" r:id="rId7"/>
-    <p:sldId id="262" r:id="rId8"/>
-    <p:sldId id="263" r:id="rId9"/>
-    <p:sldId id="266" r:id="rId10"/>
-    <p:sldId id="264" r:id="rId11"/>
-    <p:sldId id="265" r:id="rId12"/>
+    <p:sldId id="267" r:id="rId7"/>
+    <p:sldId id="268" r:id="rId8"/>
+    <p:sldId id="261" r:id="rId9"/>
+    <p:sldId id="262" r:id="rId10"/>
+    <p:sldId id="263" r:id="rId11"/>
+    <p:sldId id="266" r:id="rId12"/>
+    <p:sldId id="264" r:id="rId13"/>
+    <p:sldId id="265" r:id="rId14"/>
   </p:sldIdLst>
   <p:sldSz cx="12192000" cy="6858000"/>
   <p:notesSz cx="6858000" cy="9144000"/>
@@ -3910,6 +3912,13 @@
   <p:clrMapOvr>
     <a:masterClrMapping/>
   </p:clrMapOvr>
+  <p:timing>
+    <p:tnLst>
+      <p:par>
+        <p:cTn id="1" dur="indefinite" restart="never" nodeType="tmRoot"/>
+      </p:par>
+    </p:tnLst>
+  </p:timing>
 </p:sld>
 </file>
 
@@ -3947,7 +3956,7 @@
           <a:p>
             <a:r>
               <a:rPr lang="pt-PT" dirty="0" smtClean="0"/>
-              <a:t>Funcionalidade Destaque</a:t>
+              <a:t>Funcionalidades Implementadas</a:t>
             </a:r>
             <a:endParaRPr lang="pt-PT" dirty="0"/>
           </a:p>
@@ -3963,14 +3972,21 @@
             <p:ph idx="1"/>
           </p:nvPr>
         </p:nvSpPr>
-        <p:spPr/>
-        <p:txBody>
-          <a:bodyPr/>
+        <p:spPr>
+          <a:xfrm>
+            <a:off x="1097279" y="1845734"/>
+            <a:ext cx="10844512" cy="4459532"/>
+          </a:xfrm>
+        </p:spPr>
+        <p:txBody>
+          <a:bodyPr>
+            <a:normAutofit fontScale="85000" lnSpcReduction="20000"/>
+          </a:bodyPr>
           <a:lstStyle/>
           <a:p>
             <a:r>
               <a:rPr lang="pt-PT" b="1" dirty="0" smtClean="0"/>
-              <a:t>Alocação dinâmica de salas</a:t>
+              <a:t>Eventos</a:t>
             </a:r>
           </a:p>
           <a:p>
@@ -3980,7 +3996,7 @@
             </a:pPr>
             <a:r>
               <a:rPr lang="pt-PT" dirty="0" smtClean="0"/>
-              <a:t>Aloca salas aos eventos tendo em conta a sua disponibilidade no horário em que decorre o evento para que não haja sobreposição de eventos na mesma sala - Completa</a:t>
+              <a:t>Adicionar novo evento – Completa</a:t>
             </a:r>
           </a:p>
           <a:p>
@@ -3990,16 +4006,97 @@
             </a:pPr>
             <a:r>
               <a:rPr lang="pt-PT" dirty="0" smtClean="0"/>
-              <a:t>Permite a alocação de salas aos eventos de forma a otimizar o rácio capacidade </a:t>
-            </a:r>
-            <a:r>
-              <a:rPr lang="pt-PT" dirty="0"/>
-              <a:t>da sala/lotação máxima do evento</a:t>
-            </a:r>
-            <a:r>
-              <a:rPr lang="pt-PT" dirty="0" smtClean="0"/>
-              <a:t> - Completa</a:t>
-            </a:r>
+              <a:t>Remover evento – Completa</a:t>
+            </a:r>
+          </a:p>
+          <a:p>
+            <a:pPr>
+              <a:buFont typeface="Arial" panose="020B0604020202020204" pitchFamily="34" charset="0"/>
+              <a:buChar char="•"/>
+            </a:pPr>
+            <a:r>
+              <a:rPr lang="pt-PT" dirty="0" smtClean="0"/>
+              <a:t>Listar todos os eventos existentes – Completa</a:t>
+            </a:r>
+          </a:p>
+          <a:p>
+            <a:pPr>
+              <a:buFont typeface="Arial" panose="020B0604020202020204" pitchFamily="34" charset="0"/>
+              <a:buChar char="•"/>
+            </a:pPr>
+            <a:r>
+              <a:rPr lang="pt-PT" dirty="0" smtClean="0"/>
+              <a:t>Listar informação de cada evento – Completa</a:t>
+            </a:r>
+          </a:p>
+          <a:p>
+            <a:pPr>
+              <a:buFont typeface="Arial" panose="020B0604020202020204" pitchFamily="34" charset="0"/>
+              <a:buChar char="•"/>
+            </a:pPr>
+            <a:r>
+              <a:rPr lang="pt-PT" dirty="0" smtClean="0"/>
+              <a:t>Ordenar eventos de acordo com vários parâmetros (nome, data, preço, lotação) – Completa</a:t>
+            </a:r>
+          </a:p>
+          <a:p>
+            <a:pPr>
+              <a:buFont typeface="Arial" panose="020B0604020202020204" pitchFamily="34" charset="0"/>
+              <a:buChar char="•"/>
+            </a:pPr>
+            <a:r>
+              <a:rPr lang="pt-PT" dirty="0" smtClean="0"/>
+              <a:t>Informação sobre número de bilhetes comprados e total de vendas atualizada sempre que ocorre uma compra - Completa</a:t>
+            </a:r>
+            <a:endParaRPr lang="pt-PT" dirty="0"/>
+          </a:p>
+          <a:p>
+            <a:r>
+              <a:rPr lang="pt-PT" b="1" dirty="0" smtClean="0"/>
+              <a:t>Aderentes</a:t>
+            </a:r>
+          </a:p>
+          <a:p>
+            <a:pPr>
+              <a:buFont typeface="Arial" panose="020B0604020202020204" pitchFamily="34" charset="0"/>
+              <a:buChar char="•"/>
+            </a:pPr>
+            <a:r>
+              <a:rPr lang="pt-PT" dirty="0" smtClean="0"/>
+              <a:t>Adicionar novo aderente – Completa</a:t>
+            </a:r>
+          </a:p>
+          <a:p>
+            <a:pPr>
+              <a:buFont typeface="Arial" panose="020B0604020202020204" pitchFamily="34" charset="0"/>
+              <a:buChar char="•"/>
+            </a:pPr>
+            <a:r>
+              <a:rPr lang="pt-PT" dirty="0" smtClean="0"/>
+              <a:t>Remover aderente – Completa</a:t>
+            </a:r>
+          </a:p>
+          <a:p>
+            <a:pPr>
+              <a:buFont typeface="Arial" panose="020B0604020202020204" pitchFamily="34" charset="0"/>
+              <a:buChar char="•"/>
+            </a:pPr>
+            <a:r>
+              <a:rPr lang="pt-PT" dirty="0" smtClean="0"/>
+              <a:t>Listar todos os aderentes e as suas informações – Completa</a:t>
+            </a:r>
+          </a:p>
+          <a:p>
+            <a:pPr>
+              <a:buFont typeface="Arial" panose="020B0604020202020204" pitchFamily="34" charset="0"/>
+              <a:buChar char="•"/>
+            </a:pPr>
+            <a:r>
+              <a:rPr lang="pt-PT" dirty="0" smtClean="0"/>
+              <a:t>Ordenar aderentes de acordo com vários parâmetros (nome, data de nascimento, ano de adesão) - Completa</a:t>
+            </a:r>
+          </a:p>
+          <a:p>
             <a:endParaRPr lang="pt-PT" dirty="0"/>
           </a:p>
         </p:txBody>
@@ -4007,13 +4104,20 @@
     </p:spTree>
     <p:extLst>
       <p:ext uri="{BB962C8B-B14F-4D97-AF65-F5344CB8AC3E}">
-        <p14:creationId xmlns:p14="http://schemas.microsoft.com/office/powerpoint/2010/main" val="3695671712"/>
+        <p14:creationId xmlns:p14="http://schemas.microsoft.com/office/powerpoint/2010/main" val="1952814845"/>
       </p:ext>
     </p:extLst>
   </p:cSld>
   <p:clrMapOvr>
     <a:masterClrMapping/>
   </p:clrMapOvr>
+  <p:timing>
+    <p:tnLst>
+      <p:par>
+        <p:cTn id="1" dur="indefinite" restart="never" nodeType="tmRoot"/>
+      </p:par>
+    </p:tnLst>
+  </p:timing>
 </p:sld>
 </file>
 
@@ -4051,6 +4155,264 @@
           <a:p>
             <a:r>
               <a:rPr lang="pt-PT" dirty="0" smtClean="0"/>
+              <a:t>Funcionalidades Implementadas</a:t>
+            </a:r>
+            <a:endParaRPr lang="pt-PT" dirty="0"/>
+          </a:p>
+        </p:txBody>
+      </p:sp>
+      <p:sp>
+        <p:nvSpPr>
+          <p:cNvPr id="3" name="Marcador de Posição de Conteúdo 2"/>
+          <p:cNvSpPr>
+            <a:spLocks noGrp="1"/>
+          </p:cNvSpPr>
+          <p:nvPr>
+            <p:ph idx="1"/>
+          </p:nvPr>
+        </p:nvSpPr>
+        <p:spPr/>
+        <p:txBody>
+          <a:bodyPr>
+            <a:normAutofit/>
+          </a:bodyPr>
+          <a:lstStyle/>
+          <a:p>
+            <a:r>
+              <a:rPr lang="pt-PT" b="1" dirty="0" smtClean="0"/>
+              <a:t>Comprar bilhete</a:t>
+            </a:r>
+          </a:p>
+          <a:p>
+            <a:pPr>
+              <a:buFont typeface="Arial" panose="020B0604020202020204" pitchFamily="34" charset="0"/>
+              <a:buChar char="•"/>
+            </a:pPr>
+            <a:r>
+              <a:rPr lang="pt-PT" dirty="0" smtClean="0"/>
+              <a:t>Comprar bilhete caso o utilizador não seja aderente - Completa</a:t>
+            </a:r>
+          </a:p>
+          <a:p>
+            <a:pPr>
+              <a:buFont typeface="Arial" panose="020B0604020202020204" pitchFamily="34" charset="0"/>
+              <a:buChar char="•"/>
+            </a:pPr>
+            <a:r>
+              <a:rPr lang="pt-PT" dirty="0" smtClean="0"/>
+              <a:t>Comprar bilhete caso o utilizador seja aderente - Completa</a:t>
+            </a:r>
+          </a:p>
+          <a:p>
+            <a:pPr>
+              <a:buFont typeface="Arial" panose="020B0604020202020204" pitchFamily="34" charset="0"/>
+              <a:buChar char="•"/>
+            </a:pPr>
+            <a:r>
+              <a:rPr lang="pt-PT" dirty="0" smtClean="0"/>
+              <a:t>Aplicação de desconto a aderente de acordo com o ano de adesão (max. 15%) - Completa</a:t>
+            </a:r>
+          </a:p>
+          <a:p>
+            <a:pPr>
+              <a:buFont typeface="Arial" panose="020B0604020202020204" pitchFamily="34" charset="0"/>
+              <a:buChar char="•"/>
+            </a:pPr>
+            <a:r>
+              <a:rPr lang="pt-PT" dirty="0" smtClean="0"/>
+              <a:t>Opção de bilhete gratuito para aderentes do Porto com mais de 65 anos caso o número de bilhetes comprados seja menor que 50% do total de bilhetes – Completa</a:t>
+            </a:r>
+          </a:p>
+          <a:p>
+            <a:pPr>
+              <a:buFont typeface="Arial" panose="020B0604020202020204" pitchFamily="34" charset="0"/>
+              <a:buChar char="•"/>
+            </a:pPr>
+            <a:r>
+              <a:rPr lang="pt-PT" dirty="0" smtClean="0"/>
+              <a:t>Ordenar eventos de acordo com vários parâmetros (nome, data, preço, lotação) - Completa</a:t>
+            </a:r>
+            <a:endParaRPr lang="pt-PT" dirty="0"/>
+          </a:p>
+          <a:p>
+            <a:endParaRPr lang="pt-PT" dirty="0"/>
+          </a:p>
+        </p:txBody>
+      </p:sp>
+    </p:spTree>
+    <p:extLst>
+      <p:ext uri="{BB962C8B-B14F-4D97-AF65-F5344CB8AC3E}">
+        <p14:creationId xmlns:p14="http://schemas.microsoft.com/office/powerpoint/2010/main" val="4052263421"/>
+      </p:ext>
+    </p:extLst>
+  </p:cSld>
+  <p:clrMapOvr>
+    <a:masterClrMapping/>
+  </p:clrMapOvr>
+  <p:timing>
+    <p:tnLst>
+      <p:par>
+        <p:cTn id="1" dur="indefinite" restart="never" nodeType="tmRoot"/>
+      </p:par>
+    </p:tnLst>
+  </p:timing>
+</p:sld>
+</file>
+
+<file path=ppt/slides/slide12.xml><?xml version="1.0" encoding="utf-8"?>
+<p:sld xmlns:a="http://schemas.openxmlformats.org/drawingml/2006/main" xmlns:r="http://schemas.openxmlformats.org/officeDocument/2006/relationships" xmlns:p="http://schemas.openxmlformats.org/presentationml/2006/main">
+  <p:cSld>
+    <p:spTree>
+      <p:nvGrpSpPr>
+        <p:cNvPr id="1" name=""/>
+        <p:cNvGrpSpPr/>
+        <p:nvPr/>
+      </p:nvGrpSpPr>
+      <p:grpSpPr>
+        <a:xfrm>
+          <a:off x="0" y="0"/>
+          <a:ext cx="0" cy="0"/>
+          <a:chOff x="0" y="0"/>
+          <a:chExt cx="0" cy="0"/>
+        </a:xfrm>
+      </p:grpSpPr>
+      <p:sp>
+        <p:nvSpPr>
+          <p:cNvPr id="2" name="Título 1"/>
+          <p:cNvSpPr>
+            <a:spLocks noGrp="1"/>
+          </p:cNvSpPr>
+          <p:nvPr>
+            <p:ph type="title"/>
+          </p:nvPr>
+        </p:nvSpPr>
+        <p:spPr/>
+        <p:txBody>
+          <a:bodyPr/>
+          <a:lstStyle/>
+          <a:p>
+            <a:r>
+              <a:rPr lang="pt-PT" dirty="0" smtClean="0"/>
+              <a:t>Funcionalidade Destaque</a:t>
+            </a:r>
+            <a:endParaRPr lang="pt-PT" dirty="0"/>
+          </a:p>
+        </p:txBody>
+      </p:sp>
+      <p:sp>
+        <p:nvSpPr>
+          <p:cNvPr id="3" name="Marcador de Posição de Conteúdo 2"/>
+          <p:cNvSpPr>
+            <a:spLocks noGrp="1"/>
+          </p:cNvSpPr>
+          <p:nvPr>
+            <p:ph idx="1"/>
+          </p:nvPr>
+        </p:nvSpPr>
+        <p:spPr/>
+        <p:txBody>
+          <a:bodyPr/>
+          <a:lstStyle/>
+          <a:p>
+            <a:r>
+              <a:rPr lang="pt-PT" b="1" dirty="0" smtClean="0"/>
+              <a:t>Alocação dinâmica de salas</a:t>
+            </a:r>
+          </a:p>
+          <a:p>
+            <a:pPr>
+              <a:buFont typeface="Arial" panose="020B0604020202020204" pitchFamily="34" charset="0"/>
+              <a:buChar char="•"/>
+            </a:pPr>
+            <a:r>
+              <a:rPr lang="pt-PT" dirty="0" smtClean="0"/>
+              <a:t>Aloca salas aos eventos tendo em conta a sua disponibilidade no horário em que decorre o evento para que não haja sobreposição de eventos na mesma sala - Completa</a:t>
+            </a:r>
+          </a:p>
+          <a:p>
+            <a:pPr>
+              <a:buFont typeface="Arial" panose="020B0604020202020204" pitchFamily="34" charset="0"/>
+              <a:buChar char="•"/>
+            </a:pPr>
+            <a:r>
+              <a:rPr lang="pt-PT" dirty="0" smtClean="0"/>
+              <a:t>Permite a alocação de salas aos eventos de forma a otimizar o rácio capacidade </a:t>
+            </a:r>
+            <a:r>
+              <a:rPr lang="pt-PT" dirty="0"/>
+              <a:t>da sala/lotação máxima do </a:t>
+            </a:r>
+            <a:r>
+              <a:rPr lang="pt-PT" dirty="0" smtClean="0"/>
+              <a:t>evento, com o propósito de minimizar o número de lugares vazios numa sala – Completa</a:t>
+            </a:r>
+          </a:p>
+          <a:p>
+            <a:pPr marL="0" indent="0">
+              <a:buNone/>
+            </a:pPr>
+            <a:r>
+              <a:rPr lang="pt-PT" dirty="0" smtClean="0"/>
+              <a:t>Consideramos relevante destacar esta funcionalidade pois fomos para além de funcionalidades CRUD ou de listagem, e implementamos um algoritmo com o propósito de otimizar a alocação de salas e não só executar a alocação.</a:t>
+            </a:r>
+            <a:endParaRPr lang="pt-PT" dirty="0"/>
+          </a:p>
+        </p:txBody>
+      </p:sp>
+    </p:spTree>
+    <p:extLst>
+      <p:ext uri="{BB962C8B-B14F-4D97-AF65-F5344CB8AC3E}">
+        <p14:creationId xmlns:p14="http://schemas.microsoft.com/office/powerpoint/2010/main" val="3695671712"/>
+      </p:ext>
+    </p:extLst>
+  </p:cSld>
+  <p:clrMapOvr>
+    <a:masterClrMapping/>
+  </p:clrMapOvr>
+  <p:timing>
+    <p:tnLst>
+      <p:par>
+        <p:cTn id="1" dur="indefinite" restart="never" nodeType="tmRoot"/>
+      </p:par>
+    </p:tnLst>
+  </p:timing>
+</p:sld>
+</file>
+
+<file path=ppt/slides/slide13.xml><?xml version="1.0" encoding="utf-8"?>
+<p:sld xmlns:a="http://schemas.openxmlformats.org/drawingml/2006/main" xmlns:r="http://schemas.openxmlformats.org/officeDocument/2006/relationships" xmlns:p="http://schemas.openxmlformats.org/presentationml/2006/main">
+  <p:cSld>
+    <p:spTree>
+      <p:nvGrpSpPr>
+        <p:cNvPr id="1" name=""/>
+        <p:cNvGrpSpPr/>
+        <p:nvPr/>
+      </p:nvGrpSpPr>
+      <p:grpSpPr>
+        <a:xfrm>
+          <a:off x="0" y="0"/>
+          <a:ext cx="0" cy="0"/>
+          <a:chOff x="0" y="0"/>
+          <a:chExt cx="0" cy="0"/>
+        </a:xfrm>
+      </p:grpSpPr>
+      <p:sp>
+        <p:nvSpPr>
+          <p:cNvPr id="2" name="Título 1"/>
+          <p:cNvSpPr>
+            <a:spLocks noGrp="1"/>
+          </p:cNvSpPr>
+          <p:nvPr>
+            <p:ph type="title"/>
+          </p:nvPr>
+        </p:nvSpPr>
+        <p:spPr/>
+        <p:txBody>
+          <a:bodyPr/>
+          <a:lstStyle/>
+          <a:p>
+            <a:r>
+              <a:rPr lang="pt-PT" dirty="0" smtClean="0"/>
               <a:t>Dificuldades e Esforço</a:t>
             </a:r>
             <a:endParaRPr lang="pt-PT" dirty="0"/>
@@ -4115,6 +4477,13 @@
   <p:clrMapOvr>
     <a:masterClrMapping/>
   </p:clrMapOvr>
+  <p:timing>
+    <p:tnLst>
+      <p:par>
+        <p:cTn id="1" dur="indefinite" restart="never" nodeType="tmRoot"/>
+      </p:par>
+    </p:tnLst>
+  </p:timing>
 </p:sld>
 </file>
 
@@ -4291,24 +4660,15 @@
             </a:r>
             <a:r>
               <a:rPr lang="pt-PT" dirty="0" smtClean="0"/>
-              <a:t>intuitiva</a:t>
-            </a:r>
-            <a:r>
-              <a:rPr lang="pt-PT" dirty="0" smtClean="0"/>
-              <a:t>, a partir da qual podemos gerir todas as necessidades descritas anteriormente.</a:t>
+              <a:t>intuitiva, a partir da qual podemos gerir todas as necessidades descritas anteriormente.</a:t>
             </a:r>
           </a:p>
           <a:p>
             <a:pPr algn="just"/>
             <a:r>
               <a:rPr lang="pt-PT" dirty="0" smtClean="0"/>
-              <a:t>A partir do menu principal temos várias opções relativas à gestão dos eventos, nomeadamente a possibilidade de adicionar, listar, apagar e ordenar os vários eventos. </a:t>
-            </a:r>
-            <a:r>
-              <a:rPr lang="pt-PT" dirty="0" smtClean="0"/>
-              <a:t>Ao aceder ás informações de cada evento conseguimos ainda ver informações importantes como o número de bilhetes vendidos e o lucro total de vendas até à data.</a:t>
-            </a:r>
-            <a:endParaRPr lang="pt-PT" dirty="0" smtClean="0"/>
+              <a:t>A partir do menu principal temos várias opções relativas à gestão dos eventos, nomeadamente a possibilidade de adicionar, listar, apagar e ordenar os vários eventos. Ao aceder ás informações de cada evento conseguimos ainda ver informações importantes como o número de bilhetes vendidos e o lucro total de vendas até à data.</a:t>
+            </a:r>
           </a:p>
           <a:p>
             <a:pPr algn="just"/>
@@ -4444,13 +4804,8 @@
             </a:br>
             <a:r>
               <a:rPr lang="pt-PT" dirty="0" smtClean="0"/>
-              <a:t>A </a:t>
-            </a:r>
-            <a:r>
-              <a:rPr lang="pt-PT" dirty="0" smtClean="0"/>
-              <a:t>alocação de salas aos eventos é feita de forma a otimizar o rácio capacidade da sala/lotação máxima do evento. Ou seja, alocamos as salas de forma a que a lotação máxima do evento seja o mais próxima possível da capacidade da sala, de forma a minimizar o número de lugares desperdiçados. Esta alocação é feita com recurso à ordenação de forma ascendente das capacidades das salas, sendo também verificada a disponibilidade de cada sala para aquele evento, e em caso de disponibilidade é feita a atribuição da sala com menor capacidade viável para o evento.</a:t>
-            </a:r>
-            <a:endParaRPr lang="pt-PT" dirty="0" smtClean="0"/>
+              <a:t>A alocação de salas aos eventos é feita de forma a otimizar o rácio capacidade da sala/lotação máxima do evento. Ou seja, alocamos as salas de forma a que a lotação máxima do evento seja o mais próxima possível da capacidade da sala, de forma a minimizar o número de lugares desperdiçados. Esta alocação é feita com recurso à ordenação de forma ascendente das capacidades das salas, sendo também verificada a disponibilidade de cada sala para aquele evento, e em caso de disponibilidade é feita a atribuição da sala com menor capacidade viável para o evento.</a:t>
+            </a:r>
           </a:p>
           <a:p>
             <a:r>
@@ -4524,6 +4879,13 @@
   <p:clrMapOvr>
     <a:masterClrMapping/>
   </p:clrMapOvr>
+  <p:timing>
+    <p:tnLst>
+      <p:par>
+        <p:cTn id="1" dur="indefinite" restart="never" nodeType="tmRoot"/>
+      </p:par>
+    </p:tnLst>
+  </p:timing>
 </p:sld>
 </file>
 
@@ -4567,25 +4929,34 @@
           </a:p>
         </p:txBody>
       </p:sp>
-      <p:sp>
-        <p:nvSpPr>
-          <p:cNvPr id="3" name="Marcador de Posição de Conteúdo 2"/>
-          <p:cNvSpPr>
-            <a:spLocks noGrp="1"/>
-          </p:cNvSpPr>
+      <p:pic>
+        <p:nvPicPr>
+          <p:cNvPr id="4" name="Marcador de Posição de Conteúdo 3"/>
+          <p:cNvPicPr>
+            <a:picLocks noGrp="1" noChangeAspect="1"/>
+          </p:cNvPicPr>
           <p:nvPr>
             <p:ph idx="1"/>
           </p:nvPr>
-        </p:nvSpPr>
-        <p:spPr/>
-        <p:txBody>
-          <a:bodyPr/>
-          <a:lstStyle/>
-          <a:p>
-            <a:endParaRPr lang="pt-PT"/>
-          </a:p>
-        </p:txBody>
-      </p:sp>
+        </p:nvPicPr>
+        <p:blipFill rotWithShape="1">
+          <a:blip r:embed="rId2">
+            <a:extLst>
+              <a:ext uri="{28A0092B-C50C-407E-A947-70E740481C1C}">
+                <a14:useLocalDpi xmlns:a14="http://schemas.microsoft.com/office/drawing/2010/main" val="0"/>
+              </a:ext>
+            </a:extLst>
+          </a:blip>
+          <a:srcRect t="5176" b="5020"/>
+          <a:stretch/>
+        </p:blipFill>
+        <p:spPr>
+          <a:xfrm>
+            <a:off x="4039737" y="1768162"/>
+            <a:ext cx="4476466" cy="4540010"/>
+          </a:xfrm>
+        </p:spPr>
+      </p:pic>
     </p:spTree>
     <p:extLst>
       <p:ext uri="{BB962C8B-B14F-4D97-AF65-F5344CB8AC3E}">
@@ -4596,6 +4967,21 @@
   <p:clrMapOvr>
     <a:masterClrMapping/>
   </p:clrMapOvr>
+  <mc:AlternateContent xmlns:mc="http://schemas.openxmlformats.org/markup-compatibility/2006">
+    <mc:Choice xmlns:p14="http://schemas.microsoft.com/office/powerpoint/2010/main" Requires="p14">
+      <p:transition spd="slow" p14:dur="2000"/>
+    </mc:Choice>
+    <mc:Fallback>
+      <p:transition spd="slow"/>
+    </mc:Fallback>
+  </mc:AlternateContent>
+  <p:timing>
+    <p:tnLst>
+      <p:par>
+        <p:cTn id="1" dur="indefinite" restart="never" nodeType="tmRoot"/>
+      </p:par>
+    </p:tnLst>
+  </p:timing>
 </p:sld>
 </file>
 
@@ -4616,165 +5002,59 @@
           <a:chExt cx="0" cy="0"/>
         </a:xfrm>
       </p:grpSpPr>
-      <p:sp>
-        <p:nvSpPr>
-          <p:cNvPr id="2" name="Título 1"/>
-          <p:cNvSpPr>
-            <a:spLocks noGrp="1"/>
-          </p:cNvSpPr>
-          <p:nvPr>
-            <p:ph type="title"/>
-          </p:nvPr>
-        </p:nvSpPr>
-        <p:spPr/>
-        <p:txBody>
-          <a:bodyPr/>
-          <a:lstStyle/>
-          <a:p>
-            <a:r>
-              <a:rPr lang="pt-PT" dirty="0" smtClean="0"/>
-              <a:t>Estrutura de ficheiros</a:t>
-            </a:r>
-            <a:endParaRPr lang="pt-PT" dirty="0"/>
-          </a:p>
-        </p:txBody>
-      </p:sp>
-      <p:sp>
-        <p:nvSpPr>
-          <p:cNvPr id="3" name="Marcador de Posição de Conteúdo 2"/>
-          <p:cNvSpPr>
-            <a:spLocks noGrp="1"/>
-          </p:cNvSpPr>
+      <p:pic>
+        <p:nvPicPr>
+          <p:cNvPr id="7" name="Marcador de Posição de Conteúdo 6"/>
+          <p:cNvPicPr>
+            <a:picLocks noGrp="1" noChangeAspect="1"/>
+          </p:cNvPicPr>
           <p:nvPr>
             <p:ph idx="1"/>
           </p:nvPr>
-        </p:nvSpPr>
-        <p:spPr/>
-        <p:txBody>
-          <a:bodyPr>
-            <a:normAutofit lnSpcReduction="10000"/>
-          </a:bodyPr>
-          <a:lstStyle/>
-          <a:p>
-            <a:r>
-              <a:rPr lang="pt-PT" dirty="0" smtClean="0"/>
-              <a:t>Toda a informação relativa aos dados dos aderentes, não aderentes, salas e eventos é guardada em ficheiros de forma a que essa informação esteja sempre disponível ao voltar a correr o programa.</a:t>
-            </a:r>
-          </a:p>
-          <a:p>
-            <a:r>
-              <a:rPr lang="pt-PT" dirty="0" smtClean="0"/>
-              <a:t>Ao inicializar o programa, os ficheiros aderentes.dat, não_aderentes.dat, eventos.dat e salas.dat são abertos e toda a informação neles guardada é inserida nas respetivas estruturas de dados das classes. Isto é feito com recurso ás </a:t>
-            </a:r>
-            <a:r>
-              <a:rPr lang="pt-PT" b="1" dirty="0" smtClean="0"/>
-              <a:t>funções de parse </a:t>
-            </a:r>
-            <a:r>
-              <a:rPr lang="pt-PT" dirty="0" smtClean="0"/>
-              <a:t>que criamos para cada ficheiro, nomeadamente a </a:t>
-            </a:r>
-            <a:r>
-              <a:rPr lang="pt-PT" dirty="0" err="1" smtClean="0"/>
-              <a:t>parseSalas</a:t>
-            </a:r>
-            <a:r>
-              <a:rPr lang="pt-PT" dirty="0" smtClean="0"/>
-              <a:t>, </a:t>
-            </a:r>
-            <a:r>
-              <a:rPr lang="pt-PT" dirty="0" err="1" smtClean="0"/>
-              <a:t>parseEventos</a:t>
-            </a:r>
-            <a:r>
-              <a:rPr lang="pt-PT" dirty="0" smtClean="0"/>
-              <a:t>, </a:t>
-            </a:r>
-            <a:r>
-              <a:rPr lang="pt-PT" dirty="0" err="1" smtClean="0"/>
-              <a:t>parseAderentes</a:t>
-            </a:r>
-            <a:r>
-              <a:rPr lang="pt-PT" dirty="0" smtClean="0"/>
-              <a:t> e </a:t>
-            </a:r>
-            <a:r>
-              <a:rPr lang="pt-PT" dirty="0" err="1" smtClean="0"/>
-              <a:t>parseNaoAderentes</a:t>
-            </a:r>
-            <a:r>
-              <a:rPr lang="pt-PT" dirty="0" smtClean="0"/>
-              <a:t>.</a:t>
-            </a:r>
-          </a:p>
-          <a:p>
-            <a:r>
-              <a:rPr lang="pt-PT" dirty="0" smtClean="0"/>
-              <a:t>Sempre que é adicionado um aderente, um não aderente (utilizador comum) ou um evento, a informação é logo atualizada no ficheiro correspondente e não apenas aquando do término do programa.</a:t>
-            </a:r>
-          </a:p>
-          <a:p>
-            <a:r>
-              <a:rPr lang="pt-PT" dirty="0" smtClean="0"/>
-              <a:t>O mesmo sucede com a deleção de aderentes ou eventos, de forma que a informação guardada em ficheiro esteja sempre atualizada. Isto é feito com recurso ás </a:t>
-            </a:r>
-            <a:r>
-              <a:rPr lang="pt-PT" b="1" dirty="0" smtClean="0"/>
-              <a:t>funç</a:t>
-            </a:r>
-            <a:r>
-              <a:rPr lang="pt-PT" b="1" dirty="0" smtClean="0"/>
-              <a:t>ões de </a:t>
-            </a:r>
-            <a:r>
-              <a:rPr lang="pt-PT" b="1" dirty="0" err="1" smtClean="0"/>
-              <a:t>update</a:t>
-            </a:r>
-            <a:r>
-              <a:rPr lang="pt-PT" dirty="0" smtClean="0"/>
-              <a:t>, nomeadamente a </a:t>
-            </a:r>
-            <a:r>
-              <a:rPr lang="pt-PT" dirty="0" err="1" smtClean="0"/>
-              <a:t>updateAderentes</a:t>
-            </a:r>
-            <a:r>
-              <a:rPr lang="pt-PT" dirty="0" smtClean="0"/>
-              <a:t>, </a:t>
-            </a:r>
-            <a:r>
-              <a:rPr lang="pt-PT" dirty="0" err="1" smtClean="0"/>
-              <a:t>updateNaoAderentes</a:t>
-            </a:r>
-            <a:r>
-              <a:rPr lang="pt-PT" dirty="0" smtClean="0"/>
-              <a:t> e </a:t>
-            </a:r>
-            <a:r>
-              <a:rPr lang="pt-PT" dirty="0" err="1" smtClean="0"/>
-              <a:t>updateEventos</a:t>
-            </a:r>
-            <a:r>
-              <a:rPr lang="pt-PT" dirty="0" smtClean="0"/>
-              <a:t>.</a:t>
-            </a:r>
-            <a:endParaRPr lang="pt-PT" dirty="0" smtClean="0"/>
-          </a:p>
-          <a:p>
-            <a:endParaRPr lang="pt-PT" dirty="0"/>
-          </a:p>
-        </p:txBody>
-      </p:sp>
+        </p:nvPicPr>
+        <p:blipFill rotWithShape="1">
+          <a:blip r:embed="rId2">
+            <a:extLst>
+              <a:ext uri="{28A0092B-C50C-407E-A947-70E740481C1C}">
+                <a14:useLocalDpi xmlns:a14="http://schemas.microsoft.com/office/drawing/2010/main" val="0"/>
+              </a:ext>
+            </a:extLst>
+          </a:blip>
+          <a:srcRect t="4788" b="39778"/>
+          <a:stretch/>
+        </p:blipFill>
+        <p:spPr>
+          <a:xfrm>
+            <a:off x="996285" y="-1"/>
+            <a:ext cx="10093781" cy="6318913"/>
+          </a:xfrm>
+        </p:spPr>
+      </p:pic>
     </p:spTree>
     <p:extLst>
       <p:ext uri="{BB962C8B-B14F-4D97-AF65-F5344CB8AC3E}">
-        <p14:creationId xmlns:p14="http://schemas.microsoft.com/office/powerpoint/2010/main" val="3058032626"/>
+        <p14:creationId xmlns:p14="http://schemas.microsoft.com/office/powerpoint/2010/main" val="1011818199"/>
       </p:ext>
     </p:extLst>
   </p:cSld>
   <p:clrMapOvr>
     <a:masterClrMapping/>
   </p:clrMapOvr>
+  <mc:AlternateContent xmlns:mc="http://schemas.openxmlformats.org/markup-compatibility/2006">
+    <mc:Choice xmlns:p14="http://schemas.microsoft.com/office/powerpoint/2010/main" Requires="p14">
+      <p:transition spd="slow" p14:dur="2000"/>
+    </mc:Choice>
+    <mc:Fallback>
+      <p:transition spd="slow"/>
+    </mc:Fallback>
+  </mc:AlternateContent>
+  <p:timing>
+    <p:tnLst>
+      <p:par>
+        <p:cTn id="1" dur="indefinite" restart="never" nodeType="tmRoot"/>
+      </p:par>
+    </p:tnLst>
+  </p:timing>
 </p:sld>
 </file>
 
@@ -4795,126 +5075,59 @@
           <a:chExt cx="0" cy="0"/>
         </a:xfrm>
       </p:grpSpPr>
-      <p:sp>
-        <p:nvSpPr>
-          <p:cNvPr id="2" name="Título 1"/>
-          <p:cNvSpPr>
-            <a:spLocks noGrp="1"/>
-          </p:cNvSpPr>
-          <p:nvPr>
-            <p:ph type="title"/>
-          </p:nvPr>
-        </p:nvSpPr>
-        <p:spPr/>
-        <p:txBody>
-          <a:bodyPr/>
-          <a:lstStyle/>
-          <a:p>
-            <a:r>
-              <a:rPr lang="pt-PT" dirty="0" smtClean="0"/>
-              <a:t>Tratamento de exceções</a:t>
-            </a:r>
-            <a:endParaRPr lang="pt-PT" dirty="0"/>
-          </a:p>
-        </p:txBody>
-      </p:sp>
-      <p:sp>
-        <p:nvSpPr>
+      <p:pic>
+        <p:nvPicPr>
           <p:cNvPr id="3" name="Marcador de Posição de Conteúdo 2"/>
-          <p:cNvSpPr>
-            <a:spLocks noGrp="1"/>
-          </p:cNvSpPr>
+          <p:cNvPicPr>
+            <a:picLocks noGrp="1" noChangeAspect="1"/>
+          </p:cNvPicPr>
           <p:nvPr>
             <p:ph idx="1"/>
           </p:nvPr>
-        </p:nvSpPr>
-        <p:spPr/>
-        <p:txBody>
-          <a:bodyPr>
-            <a:normAutofit lnSpcReduction="10000"/>
-          </a:bodyPr>
-          <a:lstStyle/>
-          <a:p>
-            <a:r>
-              <a:rPr lang="pt-PT" dirty="0" smtClean="0"/>
-              <a:t>Ao longo do projeto foram feitos tratamentos para vários tipos de exceções, dos quais damos como exemplo:</a:t>
-            </a:r>
-          </a:p>
-          <a:p>
-            <a:r>
-              <a:rPr lang="pt-PT" b="1" dirty="0"/>
-              <a:t>I</a:t>
-            </a:r>
-            <a:r>
-              <a:rPr lang="pt-PT" b="1" dirty="0" smtClean="0"/>
-              <a:t>nputs inválidos </a:t>
-            </a:r>
-            <a:r>
-              <a:rPr lang="pt-PT" dirty="0" smtClean="0"/>
-              <a:t/>
-            </a:r>
-            <a:br>
-              <a:rPr lang="pt-PT" dirty="0" smtClean="0"/>
-            </a:br>
-            <a:r>
-              <a:rPr lang="pt-PT" dirty="0" smtClean="0"/>
-              <a:t>Escolha de uma opção que não está no menu em causa pede ao utilizador para voltar a inserir uma opção válida, </a:t>
-            </a:r>
-            <a:r>
-              <a:rPr lang="pt-PT" dirty="0"/>
-              <a:t>inserção de datas no formato errado pede ao utilizador para voltar a escrever a data até esta estar no formato </a:t>
-            </a:r>
-            <a:r>
-              <a:rPr lang="pt-PT" dirty="0" err="1" smtClean="0"/>
-              <a:t>dd</a:t>
-            </a:r>
-            <a:r>
-              <a:rPr lang="pt-PT" dirty="0" smtClean="0"/>
-              <a:t>/mm/</a:t>
-            </a:r>
-            <a:r>
-              <a:rPr lang="pt-PT" dirty="0" err="1" smtClean="0"/>
-              <a:t>aaaa</a:t>
-            </a:r>
-            <a:r>
-              <a:rPr lang="pt-PT" dirty="0" smtClean="0"/>
-              <a:t>, ao inserir o NIF é necessário que este tenha o comprimento correto de 9 dígitos, ao comprar um bilhete para um determinado evento, é verificado se um evento com aquele nome realmente existe, e caso não exista é impressa uma mensagem de erro e volta ao menu </a:t>
-            </a:r>
-            <a:r>
-              <a:rPr lang="pt-PT" smtClean="0"/>
-              <a:t>de compra.</a:t>
-            </a:r>
-            <a:endParaRPr lang="pt-PT" dirty="0" smtClean="0"/>
-          </a:p>
-          <a:p>
-            <a:r>
-              <a:rPr lang="pt-PT" b="1" dirty="0" smtClean="0"/>
-              <a:t>Abertura de ficheiros</a:t>
-            </a:r>
-            <a:br>
-              <a:rPr lang="pt-PT" b="1" dirty="0" smtClean="0"/>
-            </a:br>
-            <a:r>
-              <a:rPr lang="pt-PT" dirty="0" smtClean="0"/>
-              <a:t>Caso ocorra um erro na abertura de um ficheiro, por exemplo ao inicializar o programa quando as várias listas são preenchidas com os dados guardados em ficheiro relativos aos aderentes, não aderentes e aos eventos, é feito o tratamento deste erro.</a:t>
-            </a:r>
-            <a:endParaRPr lang="pt-PT" b="1" dirty="0" smtClean="0"/>
-          </a:p>
-          <a:p>
-            <a:endParaRPr lang="pt-PT" dirty="0"/>
-          </a:p>
-        </p:txBody>
-      </p:sp>
+        </p:nvPicPr>
+        <p:blipFill rotWithShape="1">
+          <a:blip r:embed="rId2">
+            <a:extLst>
+              <a:ext uri="{28A0092B-C50C-407E-A947-70E740481C1C}">
+                <a14:useLocalDpi xmlns:a14="http://schemas.microsoft.com/office/drawing/2010/main" val="0"/>
+              </a:ext>
+            </a:extLst>
+          </a:blip>
+          <a:srcRect t="35320" b="5555"/>
+          <a:stretch/>
+        </p:blipFill>
+        <p:spPr>
+          <a:xfrm>
+            <a:off x="1269241" y="13648"/>
+            <a:ext cx="9422585" cy="6291618"/>
+          </a:xfrm>
+        </p:spPr>
+      </p:pic>
     </p:spTree>
     <p:extLst>
       <p:ext uri="{BB962C8B-B14F-4D97-AF65-F5344CB8AC3E}">
-        <p14:creationId xmlns:p14="http://schemas.microsoft.com/office/powerpoint/2010/main" val="1924618068"/>
+        <p14:creationId xmlns:p14="http://schemas.microsoft.com/office/powerpoint/2010/main" val="1496222528"/>
       </p:ext>
     </p:extLst>
   </p:cSld>
   <p:clrMapOvr>
     <a:masterClrMapping/>
   </p:clrMapOvr>
+  <mc:AlternateContent xmlns:mc="http://schemas.openxmlformats.org/markup-compatibility/2006">
+    <mc:Choice xmlns:p14="http://schemas.microsoft.com/office/powerpoint/2010/main" Requires="p14">
+      <p:transition spd="slow" p14:dur="2000"/>
+    </mc:Choice>
+    <mc:Fallback>
+      <p:transition spd="slow"/>
+    </mc:Fallback>
+  </mc:AlternateContent>
+  <p:timing>
+    <p:tnLst>
+      <p:par>
+        <p:cTn id="1" dur="indefinite" restart="never" nodeType="tmRoot"/>
+      </p:par>
+    </p:tnLst>
+  </p:timing>
 </p:sld>
 </file>
 
@@ -4952,7 +5165,7 @@
           <a:p>
             <a:r>
               <a:rPr lang="pt-PT" dirty="0" smtClean="0"/>
-              <a:t>Funcionalidades Implementadas</a:t>
+              <a:t>Estrutura de ficheiros</a:t>
             </a:r>
             <a:endParaRPr lang="pt-PT" dirty="0"/>
           </a:p>
@@ -4968,128 +5181,110 @@
             <p:ph idx="1"/>
           </p:nvPr>
         </p:nvSpPr>
-        <p:spPr>
-          <a:xfrm>
-            <a:off x="1097279" y="1845734"/>
-            <a:ext cx="10844512" cy="4459532"/>
-          </a:xfrm>
-        </p:spPr>
+        <p:spPr/>
         <p:txBody>
           <a:bodyPr>
-            <a:normAutofit fontScale="85000" lnSpcReduction="20000"/>
+            <a:normAutofit lnSpcReduction="10000"/>
           </a:bodyPr>
           <a:lstStyle/>
           <a:p>
             <a:r>
+              <a:rPr lang="pt-PT" dirty="0" smtClean="0"/>
+              <a:t>Toda a informação relativa aos dados dos aderentes, não aderentes, salas e eventos é guardada em ficheiros de forma a que essa informação esteja sempre disponível ao voltar a correr o programa.</a:t>
+            </a:r>
+          </a:p>
+          <a:p>
+            <a:r>
+              <a:rPr lang="pt-PT" dirty="0" smtClean="0"/>
+              <a:t>Ao inicializar o programa, os ficheiros aderentes.dat, não_aderentes.dat, eventos.dat e salas.dat são abertos e toda a informação neles guardada é inserida nas respetivas estruturas de dados das classes. Isto é feito com recurso ás </a:t>
+            </a:r>
+            <a:r>
               <a:rPr lang="pt-PT" b="1" dirty="0" smtClean="0"/>
-              <a:t>Eventos</a:t>
-            </a:r>
-          </a:p>
-          <a:p>
-            <a:pPr>
-              <a:buFont typeface="Arial" panose="020B0604020202020204" pitchFamily="34" charset="0"/>
-              <a:buChar char="•"/>
-            </a:pPr>
-            <a:r>
-              <a:rPr lang="pt-PT" dirty="0" smtClean="0"/>
-              <a:t>Adicionar novo evento – Completa</a:t>
-            </a:r>
-          </a:p>
-          <a:p>
-            <a:pPr>
-              <a:buFont typeface="Arial" panose="020B0604020202020204" pitchFamily="34" charset="0"/>
-              <a:buChar char="•"/>
-            </a:pPr>
-            <a:r>
-              <a:rPr lang="pt-PT" dirty="0" smtClean="0"/>
-              <a:t>Remover evento – Completa</a:t>
-            </a:r>
-          </a:p>
-          <a:p>
-            <a:pPr>
-              <a:buFont typeface="Arial" panose="020B0604020202020204" pitchFamily="34" charset="0"/>
-              <a:buChar char="•"/>
-            </a:pPr>
-            <a:r>
-              <a:rPr lang="pt-PT" dirty="0" smtClean="0"/>
-              <a:t>Listar todos os eventos existentes – Completa</a:t>
-            </a:r>
-          </a:p>
-          <a:p>
-            <a:pPr>
-              <a:buFont typeface="Arial" panose="020B0604020202020204" pitchFamily="34" charset="0"/>
-              <a:buChar char="•"/>
-            </a:pPr>
-            <a:r>
-              <a:rPr lang="pt-PT" dirty="0" smtClean="0"/>
-              <a:t>Listar informação de cada evento – Completa</a:t>
-            </a:r>
-          </a:p>
-          <a:p>
-            <a:pPr>
-              <a:buFont typeface="Arial" panose="020B0604020202020204" pitchFamily="34" charset="0"/>
-              <a:buChar char="•"/>
-            </a:pPr>
-            <a:r>
-              <a:rPr lang="pt-PT" dirty="0" smtClean="0"/>
-              <a:t>Ordenar eventos de acordo com vários parâmetros (nome, data, preço, lotação) – Completa</a:t>
-            </a:r>
-          </a:p>
-          <a:p>
-            <a:pPr>
-              <a:buFont typeface="Arial" panose="020B0604020202020204" pitchFamily="34" charset="0"/>
-              <a:buChar char="•"/>
-            </a:pPr>
-            <a:r>
-              <a:rPr lang="pt-PT" dirty="0" smtClean="0"/>
-              <a:t>Informação sobre número de bilhetes comprados e total de vendas atualizada sempre que ocorre uma compra - Completa</a:t>
-            </a:r>
-            <a:endParaRPr lang="pt-PT" dirty="0"/>
-          </a:p>
-          <a:p>
+              <a:t>funções de parse </a:t>
+            </a:r>
+            <a:r>
+              <a:rPr lang="pt-PT" dirty="0" smtClean="0"/>
+              <a:t>que criamos para cada ficheiro, nomeadamente a </a:t>
+            </a:r>
+            <a:r>
+              <a:rPr lang="pt-PT" dirty="0" err="1" smtClean="0"/>
+              <a:t>parseSalas</a:t>
+            </a:r>
+            <a:r>
+              <a:rPr lang="pt-PT" dirty="0" smtClean="0"/>
+              <a:t>, </a:t>
+            </a:r>
+            <a:r>
+              <a:rPr lang="pt-PT" dirty="0" err="1" smtClean="0"/>
+              <a:t>parseEventos</a:t>
+            </a:r>
+            <a:r>
+              <a:rPr lang="pt-PT" dirty="0" smtClean="0"/>
+              <a:t>, </a:t>
+            </a:r>
+            <a:r>
+              <a:rPr lang="pt-PT" dirty="0" err="1" smtClean="0"/>
+              <a:t>parseAderentes</a:t>
+            </a:r>
+            <a:r>
+              <a:rPr lang="pt-PT" dirty="0" smtClean="0"/>
+              <a:t> e </a:t>
+            </a:r>
+            <a:r>
+              <a:rPr lang="pt-PT" dirty="0" err="1" smtClean="0"/>
+              <a:t>parseNaoAderentes</a:t>
+            </a:r>
+            <a:r>
+              <a:rPr lang="pt-PT" dirty="0" smtClean="0"/>
+              <a:t>.</a:t>
+            </a:r>
+          </a:p>
+          <a:p>
+            <a:r>
+              <a:rPr lang="pt-PT" dirty="0" smtClean="0"/>
+              <a:t>Sempre que é adicionado um aderente, um não aderente (utilizador comum) ou um evento, a informação é logo atualizada no ficheiro correspondente e não apenas aquando do término do programa.</a:t>
+            </a:r>
+          </a:p>
+          <a:p>
+            <a:r>
+              <a:rPr lang="pt-PT" dirty="0" smtClean="0"/>
+              <a:t>O mesmo sucede com a deleção de aderentes ou eventos, de forma que a informação guardada em ficheiro esteja sempre atualizada. Isto é feito com recurso ás </a:t>
+            </a:r>
             <a:r>
               <a:rPr lang="pt-PT" b="1" dirty="0" smtClean="0"/>
-              <a:t>Aderentes</a:t>
-            </a:r>
-          </a:p>
-          <a:p>
-            <a:pPr>
-              <a:buFont typeface="Arial" panose="020B0604020202020204" pitchFamily="34" charset="0"/>
-              <a:buChar char="•"/>
-            </a:pPr>
-            <a:r>
-              <a:rPr lang="pt-PT" dirty="0" smtClean="0"/>
-              <a:t>Adicionar novo aderente – Completa</a:t>
-            </a:r>
-          </a:p>
-          <a:p>
-            <a:pPr>
-              <a:buFont typeface="Arial" panose="020B0604020202020204" pitchFamily="34" charset="0"/>
-              <a:buChar char="•"/>
-            </a:pPr>
-            <a:r>
-              <a:rPr lang="pt-PT" dirty="0" smtClean="0"/>
-              <a:t>Remover aderente – Completa</a:t>
-            </a:r>
-          </a:p>
-          <a:p>
-            <a:pPr>
-              <a:buFont typeface="Arial" panose="020B0604020202020204" pitchFamily="34" charset="0"/>
-              <a:buChar char="•"/>
-            </a:pPr>
-            <a:r>
-              <a:rPr lang="pt-PT" dirty="0" smtClean="0"/>
-              <a:t>Listar todos os aderentes e as suas informações – Completa</a:t>
-            </a:r>
-          </a:p>
-          <a:p>
-            <a:pPr>
-              <a:buFont typeface="Arial" panose="020B0604020202020204" pitchFamily="34" charset="0"/>
-              <a:buChar char="•"/>
-            </a:pPr>
-            <a:r>
-              <a:rPr lang="pt-PT" dirty="0" smtClean="0"/>
-              <a:t>Ordenar aderentes de acordo com vários parâmetros (nome, data de nascimento, ano de adesão) - Completa</a:t>
+              <a:t>funções de </a:t>
+            </a:r>
+            <a:r>
+              <a:rPr lang="pt-PT" b="1" dirty="0" err="1" smtClean="0"/>
+              <a:t>update</a:t>
+            </a:r>
+            <a:r>
+              <a:rPr lang="pt-PT" dirty="0" smtClean="0"/>
+              <a:t>, nomeadamente a </a:t>
+            </a:r>
+            <a:r>
+              <a:rPr lang="pt-PT" dirty="0" err="1" smtClean="0"/>
+              <a:t>updateAderentes</a:t>
+            </a:r>
+            <a:r>
+              <a:rPr lang="pt-PT" dirty="0" smtClean="0"/>
+              <a:t>, </a:t>
+            </a:r>
+            <a:r>
+              <a:rPr lang="pt-PT" dirty="0" err="1" smtClean="0"/>
+              <a:t>updateNaoAderentes</a:t>
+            </a:r>
+            <a:r>
+              <a:rPr lang="pt-PT" dirty="0" smtClean="0"/>
+              <a:t> e </a:t>
+            </a:r>
+            <a:r>
+              <a:rPr lang="pt-PT" dirty="0" err="1" smtClean="0"/>
+              <a:t>updateEventos</a:t>
+            </a:r>
+            <a:r>
+              <a:rPr lang="pt-PT" dirty="0" smtClean="0"/>
+              <a:t>.</a:t>
             </a:r>
           </a:p>
           <a:p>
@@ -5100,13 +5295,20 @@
     </p:spTree>
     <p:extLst>
       <p:ext uri="{BB962C8B-B14F-4D97-AF65-F5344CB8AC3E}">
-        <p14:creationId xmlns:p14="http://schemas.microsoft.com/office/powerpoint/2010/main" val="1952814845"/>
+        <p14:creationId xmlns:p14="http://schemas.microsoft.com/office/powerpoint/2010/main" val="3058032626"/>
       </p:ext>
     </p:extLst>
   </p:cSld>
   <p:clrMapOvr>
     <a:masterClrMapping/>
   </p:clrMapOvr>
+  <p:timing>
+    <p:tnLst>
+      <p:par>
+        <p:cTn id="1" dur="indefinite" restart="never" nodeType="tmRoot"/>
+      </p:par>
+    </p:tnLst>
+  </p:timing>
 </p:sld>
 </file>
 
@@ -5144,7 +5346,7 @@
           <a:p>
             <a:r>
               <a:rPr lang="pt-PT" dirty="0" smtClean="0"/>
-              <a:t>Funcionalidades Implementadas</a:t>
+              <a:t>Tratamento de exceções</a:t>
             </a:r>
             <a:endParaRPr lang="pt-PT" dirty="0"/>
           </a:p>
@@ -5163,65 +5365,74 @@
         <p:spPr/>
         <p:txBody>
           <a:bodyPr>
-            <a:normAutofit/>
+            <a:normAutofit lnSpcReduction="10000"/>
           </a:bodyPr>
           <a:lstStyle/>
           <a:p>
             <a:r>
+              <a:rPr lang="pt-PT" dirty="0" smtClean="0"/>
+              <a:t>Ao longo do projeto foram feitos tratamentos para vários tipos de exceções, dos quais damos como exemplo:</a:t>
+            </a:r>
+          </a:p>
+          <a:p>
+            <a:r>
+              <a:rPr lang="pt-PT" b="1" dirty="0"/>
+              <a:t>I</a:t>
+            </a:r>
+            <a:r>
               <a:rPr lang="pt-PT" b="1" dirty="0" smtClean="0"/>
-              <a:t>Comprar bilhete</a:t>
-            </a:r>
-          </a:p>
-          <a:p>
-            <a:pPr>
-              <a:buFont typeface="Arial" panose="020B0604020202020204" pitchFamily="34" charset="0"/>
-              <a:buChar char="•"/>
-            </a:pPr>
-            <a:r>
-              <a:rPr lang="pt-PT" dirty="0" smtClean="0"/>
-              <a:t>Comprar bilhete caso o utilizador não seja aderente - Completa</a:t>
-            </a:r>
-          </a:p>
-          <a:p>
-            <a:pPr>
-              <a:buFont typeface="Arial" panose="020B0604020202020204" pitchFamily="34" charset="0"/>
-              <a:buChar char="•"/>
-            </a:pPr>
-            <a:r>
-              <a:rPr lang="pt-PT" dirty="0" smtClean="0"/>
-              <a:t>Comprar bilhete caso o utilizador seja aderente - Completa</a:t>
-            </a:r>
-          </a:p>
-          <a:p>
-            <a:pPr>
-              <a:buFont typeface="Arial" panose="020B0604020202020204" pitchFamily="34" charset="0"/>
-              <a:buChar char="•"/>
-            </a:pPr>
-            <a:r>
-              <a:rPr lang="pt-PT" dirty="0" smtClean="0"/>
-              <a:t>Aplicação de desconto a aderente de acordo com o ano de adesão (max. 15%) - Completa</a:t>
-            </a:r>
-          </a:p>
-          <a:p>
-            <a:pPr>
-              <a:buFont typeface="Arial" panose="020B0604020202020204" pitchFamily="34" charset="0"/>
-              <a:buChar char="•"/>
-            </a:pPr>
-            <a:r>
-              <a:rPr lang="pt-PT" dirty="0" smtClean="0"/>
-              <a:t>Opção de bilhete gratuito para aderentes do Porto com mais de 65 anos caso o número de bilhetes comprados seja menor que 50% do total de bilhetes – Completa</a:t>
-            </a:r>
-          </a:p>
-          <a:p>
-            <a:pPr>
-              <a:buFont typeface="Arial" panose="020B0604020202020204" pitchFamily="34" charset="0"/>
-              <a:buChar char="•"/>
-            </a:pPr>
-            <a:r>
-              <a:rPr lang="pt-PT" dirty="0" smtClean="0"/>
-              <a:t>Ordenar eventos de acordo com vários parâmetros (nome, data, preço, lotação) - Completa</a:t>
-            </a:r>
-            <a:endParaRPr lang="pt-PT" dirty="0"/>
+              <a:t>nputs inválidos </a:t>
+            </a:r>
+            <a:r>
+              <a:rPr lang="pt-PT" dirty="0" smtClean="0"/>
+              <a:t/>
+            </a:r>
+            <a:br>
+              <a:rPr lang="pt-PT" dirty="0" smtClean="0"/>
+            </a:br>
+            <a:r>
+              <a:rPr lang="pt-PT" dirty="0" smtClean="0"/>
+              <a:t>Escolha de uma opção que não está no menu em causa pede ao utilizador para voltar a inserir uma opção válida, </a:t>
+            </a:r>
+            <a:r>
+              <a:rPr lang="pt-PT" dirty="0"/>
+              <a:t>inserção de datas no formato errado pede ao utilizador para voltar a escrever a data até esta estar no formato </a:t>
+            </a:r>
+            <a:r>
+              <a:rPr lang="pt-PT" dirty="0" err="1" smtClean="0"/>
+              <a:t>dd</a:t>
+            </a:r>
+            <a:r>
+              <a:rPr lang="pt-PT" dirty="0" smtClean="0"/>
+              <a:t>/mm/</a:t>
+            </a:r>
+            <a:r>
+              <a:rPr lang="pt-PT" dirty="0" err="1" smtClean="0"/>
+              <a:t>aaaa</a:t>
+            </a:r>
+            <a:r>
+              <a:rPr lang="pt-PT" dirty="0" smtClean="0"/>
+              <a:t>, ao inserir o NIF é necessário que este tenha o comprimento correto de 9 dígitos, ao comprar um bilhete para um determinado evento, é verificado se um evento com aquele nome realmente existe, e caso não exista é impressa uma mensagem de erro e volta ao menu </a:t>
+            </a:r>
+            <a:r>
+              <a:rPr lang="pt-PT" smtClean="0"/>
+              <a:t>de compra.</a:t>
+            </a:r>
+            <a:endParaRPr lang="pt-PT" dirty="0" smtClean="0"/>
+          </a:p>
+          <a:p>
+            <a:r>
+              <a:rPr lang="pt-PT" b="1" dirty="0" smtClean="0"/>
+              <a:t>Abertura de ficheiros</a:t>
+            </a:r>
+            <a:br>
+              <a:rPr lang="pt-PT" b="1" dirty="0" smtClean="0"/>
+            </a:br>
+            <a:r>
+              <a:rPr lang="pt-PT" dirty="0" smtClean="0"/>
+              <a:t>Caso ocorra um erro na abertura de um ficheiro, por exemplo ao inicializar o programa quando as várias listas são preenchidas com os dados guardados em ficheiro relativos aos aderentes, não aderentes e aos eventos, é feito o tratamento deste erro.</a:t>
+            </a:r>
+            <a:endParaRPr lang="pt-PT" b="1" dirty="0" smtClean="0"/>
           </a:p>
           <a:p>
             <a:endParaRPr lang="pt-PT" dirty="0"/>
@@ -5231,7 +5442,7 @@
     </p:spTree>
     <p:extLst>
       <p:ext uri="{BB962C8B-B14F-4D97-AF65-F5344CB8AC3E}">
-        <p14:creationId xmlns:p14="http://schemas.microsoft.com/office/powerpoint/2010/main" val="4052263421"/>
+        <p14:creationId xmlns:p14="http://schemas.microsoft.com/office/powerpoint/2010/main" val="1924618068"/>
       </p:ext>
     </p:extLst>
   </p:cSld>

</xml_diff>